<commit_message>
Cambios locales de pantalla de inicio y registrar compra, registrar usuario, compra como invitado, compra como nuevo usuario con registro usuario y registro de direccion ajax, compra con loge ajax, antes del merge
</commit_message>
<xml_diff>
--- a/estacion90.pptx
+++ b/estacion90.pptx
@@ -22,6 +22,8 @@
     <p:sldId id="271" r:id="rId16"/>
     <p:sldId id="272" r:id="rId17"/>
     <p:sldId id="274" r:id="rId18"/>
+    <p:sldId id="275" r:id="rId19"/>
+    <p:sldId id="276" r:id="rId20"/>
   </p:sldIdLst>
   <p:sldSz cx="12192000" cy="6858000"/>
   <p:notesSz cx="6858000" cy="9144000"/>
@@ -20727,6 +20729,3077 @@
     <p:extLst>
       <p:ext uri="{BB962C8B-B14F-4D97-AF65-F5344CB8AC3E}">
         <p14:creationId xmlns:p14="http://schemas.microsoft.com/office/powerpoint/2010/main" val="4225967294"/>
+      </p:ext>
+    </p:extLst>
+  </p:cSld>
+  <p:clrMapOvr>
+    <a:masterClrMapping/>
+  </p:clrMapOvr>
+</p:sld>
+</file>
+
+<file path=ppt/slides/slide18.xml><?xml version="1.0" encoding="utf-8"?>
+<p:sld xmlns:a="http://schemas.openxmlformats.org/drawingml/2006/main" xmlns:r="http://schemas.openxmlformats.org/officeDocument/2006/relationships" xmlns:p="http://schemas.openxmlformats.org/presentationml/2006/main">
+  <p:cSld>
+    <p:spTree>
+      <p:nvGrpSpPr>
+        <p:cNvPr id="1" name=""/>
+        <p:cNvGrpSpPr/>
+        <p:nvPr/>
+      </p:nvGrpSpPr>
+      <p:grpSpPr>
+        <a:xfrm>
+          <a:off x="0" y="0"/>
+          <a:ext cx="0" cy="0"/>
+          <a:chOff x="0" y="0"/>
+          <a:chExt cx="0" cy="0"/>
+        </a:xfrm>
+      </p:grpSpPr>
+      <p:pic>
+        <p:nvPicPr>
+          <p:cNvPr id="5" name="Marcador de contenido 4" descr="Interfaz de usuario gráfica&#10;&#10;Descripción generada automáticamente">
+            <a:extLst>
+              <a:ext uri="{FF2B5EF4-FFF2-40B4-BE49-F238E27FC236}">
+                <a16:creationId xmlns:a16="http://schemas.microsoft.com/office/drawing/2014/main" id="{6465FF1A-24CE-855D-278E-2176DF01B4E6}"/>
+              </a:ext>
+            </a:extLst>
+          </p:cNvPr>
+          <p:cNvPicPr>
+            <a:picLocks noGrp="1" noChangeAspect="1"/>
+          </p:cNvPicPr>
+          <p:nvPr>
+            <p:ph idx="1"/>
+          </p:nvPr>
+        </p:nvPicPr>
+        <p:blipFill rotWithShape="1">
+          <a:blip r:embed="rId2"/>
+          <a:srcRect l="4078" t="6239" r="3539" b="6323"/>
+          <a:stretch/>
+        </p:blipFill>
+        <p:spPr>
+          <a:xfrm>
+            <a:off x="270920" y="18826"/>
+            <a:ext cx="11383197" cy="6704703"/>
+          </a:xfrm>
+        </p:spPr>
+      </p:pic>
+      <p:sp>
+        <p:nvSpPr>
+          <p:cNvPr id="6" name="Rectángulo 5">
+            <a:extLst>
+              <a:ext uri="{FF2B5EF4-FFF2-40B4-BE49-F238E27FC236}">
+                <a16:creationId xmlns:a16="http://schemas.microsoft.com/office/drawing/2014/main" id="{3E1666FE-4A17-D722-7795-74AAD367FCD3}"/>
+              </a:ext>
+            </a:extLst>
+          </p:cNvPr>
+          <p:cNvSpPr/>
+          <p:nvPr/>
+        </p:nvSpPr>
+        <p:spPr>
+          <a:xfrm>
+            <a:off x="5512090" y="4166138"/>
+            <a:ext cx="2364693" cy="257821"/>
+          </a:xfrm>
+          <a:prstGeom prst="rect">
+            <a:avLst/>
+          </a:prstGeom>
+          <a:solidFill>
+            <a:schemeClr val="accent2"/>
+          </a:solidFill>
+          <a:ln>
+            <a:solidFill>
+              <a:schemeClr val="bg1">
+                <a:lumMod val="65000"/>
+              </a:schemeClr>
+            </a:solidFill>
+          </a:ln>
+        </p:spPr>
+        <p:style>
+          <a:lnRef idx="2">
+            <a:schemeClr val="accent1">
+              <a:shade val="15000"/>
+            </a:schemeClr>
+          </a:lnRef>
+          <a:fillRef idx="1">
+            <a:schemeClr val="accent1"/>
+          </a:fillRef>
+          <a:effectRef idx="0">
+            <a:schemeClr val="accent1"/>
+          </a:effectRef>
+          <a:fontRef idx="minor">
+            <a:schemeClr val="lt1"/>
+          </a:fontRef>
+        </p:style>
+        <p:txBody>
+          <a:bodyPr rtlCol="0" anchor="ctr"/>
+          <a:lstStyle/>
+          <a:p>
+            <a:pPr algn="ctr"/>
+            <a:endParaRPr lang="es-ES"/>
+          </a:p>
+        </p:txBody>
+      </p:sp>
+      <p:sp>
+        <p:nvSpPr>
+          <p:cNvPr id="7" name="CuadroTexto 6">
+            <a:extLst>
+              <a:ext uri="{FF2B5EF4-FFF2-40B4-BE49-F238E27FC236}">
+                <a16:creationId xmlns:a16="http://schemas.microsoft.com/office/drawing/2014/main" id="{B28FD435-BE5C-1D69-C1D1-E82EA2A92B11}"/>
+              </a:ext>
+            </a:extLst>
+          </p:cNvPr>
+          <p:cNvSpPr txBox="1"/>
+          <p:nvPr/>
+        </p:nvSpPr>
+        <p:spPr>
+          <a:xfrm>
+            <a:off x="5656140" y="4166139"/>
+            <a:ext cx="2220643" cy="246221"/>
+          </a:xfrm>
+          <a:prstGeom prst="rect">
+            <a:avLst/>
+          </a:prstGeom>
+          <a:noFill/>
+        </p:spPr>
+        <p:txBody>
+          <a:bodyPr wrap="square" rtlCol="0">
+            <a:spAutoFit/>
+          </a:bodyPr>
+          <a:lstStyle/>
+          <a:p>
+            <a:r>
+              <a:rPr lang="es-ES" sz="1000" b="1" dirty="0">
+                <a:solidFill>
+                  <a:schemeClr val="bg1"/>
+                </a:solidFill>
+              </a:rPr>
+              <a:t>Mover marcador a ubicación actual</a:t>
+            </a:r>
+          </a:p>
+        </p:txBody>
+      </p:sp>
+    </p:spTree>
+    <p:extLst>
+      <p:ext uri="{BB962C8B-B14F-4D97-AF65-F5344CB8AC3E}">
+        <p14:creationId xmlns:p14="http://schemas.microsoft.com/office/powerpoint/2010/main" val="2063260639"/>
+      </p:ext>
+    </p:extLst>
+  </p:cSld>
+  <p:clrMapOvr>
+    <a:masterClrMapping/>
+  </p:clrMapOvr>
+</p:sld>
+</file>
+
+<file path=ppt/slides/slide19.xml><?xml version="1.0" encoding="utf-8"?>
+<p:sld xmlns:a="http://schemas.openxmlformats.org/drawingml/2006/main" xmlns:r="http://schemas.openxmlformats.org/officeDocument/2006/relationships" xmlns:p="http://schemas.openxmlformats.org/presentationml/2006/main">
+  <p:cSld>
+    <p:spTree>
+      <p:nvGrpSpPr>
+        <p:cNvPr id="1" name="">
+          <a:extLst>
+            <a:ext uri="{FF2B5EF4-FFF2-40B4-BE49-F238E27FC236}">
+              <a16:creationId xmlns:a16="http://schemas.microsoft.com/office/drawing/2014/main" id="{D5E43594-CEFE-B8B6-FF2E-3F6F44BE8542}"/>
+            </a:ext>
+          </a:extLst>
+        </p:cNvPr>
+        <p:cNvGrpSpPr/>
+        <p:nvPr/>
+      </p:nvGrpSpPr>
+      <p:grpSpPr>
+        <a:xfrm>
+          <a:off x="0" y="0"/>
+          <a:ext cx="0" cy="0"/>
+          <a:chOff x="0" y="0"/>
+          <a:chExt cx="0" cy="0"/>
+        </a:xfrm>
+      </p:grpSpPr>
+      <p:sp>
+        <p:nvSpPr>
+          <p:cNvPr id="44" name="Rectángulo 43">
+            <a:extLst>
+              <a:ext uri="{FF2B5EF4-FFF2-40B4-BE49-F238E27FC236}">
+                <a16:creationId xmlns:a16="http://schemas.microsoft.com/office/drawing/2014/main" id="{228E41B1-0966-DFDC-5DD9-58352B57F94F}"/>
+              </a:ext>
+            </a:extLst>
+          </p:cNvPr>
+          <p:cNvSpPr/>
+          <p:nvPr/>
+        </p:nvSpPr>
+        <p:spPr>
+          <a:xfrm>
+            <a:off x="1405200" y="1288472"/>
+            <a:ext cx="1725029" cy="2010705"/>
+          </a:xfrm>
+          <a:prstGeom prst="rect">
+            <a:avLst/>
+          </a:prstGeom>
+          <a:solidFill>
+            <a:schemeClr val="bg1"/>
+          </a:solidFill>
+          <a:ln w="9525">
+            <a:solidFill>
+              <a:schemeClr val="bg1">
+                <a:lumMod val="65000"/>
+              </a:schemeClr>
+            </a:solidFill>
+          </a:ln>
+        </p:spPr>
+        <p:style>
+          <a:lnRef idx="2">
+            <a:schemeClr val="accent1">
+              <a:shade val="15000"/>
+            </a:schemeClr>
+          </a:lnRef>
+          <a:fillRef idx="1">
+            <a:schemeClr val="accent1"/>
+          </a:fillRef>
+          <a:effectRef idx="0">
+            <a:schemeClr val="accent1"/>
+          </a:effectRef>
+          <a:fontRef idx="minor">
+            <a:schemeClr val="lt1"/>
+          </a:fontRef>
+        </p:style>
+        <p:txBody>
+          <a:bodyPr rtlCol="0" anchor="ctr"/>
+          <a:lstStyle/>
+          <a:p>
+            <a:pPr algn="ctr"/>
+            <a:endParaRPr lang="es-ES"/>
+          </a:p>
+        </p:txBody>
+      </p:sp>
+      <p:sp>
+        <p:nvSpPr>
+          <p:cNvPr id="78" name="CuadroTexto 77">
+            <a:extLst>
+              <a:ext uri="{FF2B5EF4-FFF2-40B4-BE49-F238E27FC236}">
+                <a16:creationId xmlns:a16="http://schemas.microsoft.com/office/drawing/2014/main" id="{A3514D29-1C26-84E6-1281-147A14A69B94}"/>
+              </a:ext>
+            </a:extLst>
+          </p:cNvPr>
+          <p:cNvSpPr txBox="1"/>
+          <p:nvPr/>
+        </p:nvSpPr>
+        <p:spPr>
+          <a:xfrm>
+            <a:off x="1369227" y="569329"/>
+            <a:ext cx="1215397" cy="253916"/>
+          </a:xfrm>
+          <a:prstGeom prst="rect">
+            <a:avLst/>
+          </a:prstGeom>
+          <a:noFill/>
+        </p:spPr>
+        <p:txBody>
+          <a:bodyPr wrap="none" rtlCol="0">
+            <a:spAutoFit/>
+          </a:bodyPr>
+          <a:lstStyle/>
+          <a:p>
+            <a:pPr algn="r"/>
+            <a:r>
+              <a:rPr lang="es-ES" sz="1050" b="1" dirty="0"/>
+              <a:t>JUEVES 29 MAYO</a:t>
+            </a:r>
+          </a:p>
+        </p:txBody>
+      </p:sp>
+      <p:sp>
+        <p:nvSpPr>
+          <p:cNvPr id="128" name="CuadroTexto 127">
+            <a:extLst>
+              <a:ext uri="{FF2B5EF4-FFF2-40B4-BE49-F238E27FC236}">
+                <a16:creationId xmlns:a16="http://schemas.microsoft.com/office/drawing/2014/main" id="{8AD70F19-15C4-D970-FEEE-C06AD7874B6E}"/>
+              </a:ext>
+            </a:extLst>
+          </p:cNvPr>
+          <p:cNvSpPr txBox="1"/>
+          <p:nvPr/>
+        </p:nvSpPr>
+        <p:spPr>
+          <a:xfrm>
+            <a:off x="1914036" y="1328122"/>
+            <a:ext cx="652743" cy="215444"/>
+          </a:xfrm>
+          <a:prstGeom prst="rect">
+            <a:avLst/>
+          </a:prstGeom>
+          <a:noFill/>
+        </p:spPr>
+        <p:txBody>
+          <a:bodyPr wrap="none" rtlCol="0">
+            <a:spAutoFit/>
+          </a:bodyPr>
+          <a:lstStyle/>
+          <a:p>
+            <a:r>
+              <a:rPr lang="es-ES" sz="800" dirty="0"/>
+              <a:t>ORDEN #1</a:t>
+            </a:r>
+          </a:p>
+        </p:txBody>
+      </p:sp>
+      <p:sp>
+        <p:nvSpPr>
+          <p:cNvPr id="10" name="Rectángulo 9">
+            <a:extLst>
+              <a:ext uri="{FF2B5EF4-FFF2-40B4-BE49-F238E27FC236}">
+                <a16:creationId xmlns:a16="http://schemas.microsoft.com/office/drawing/2014/main" id="{F2FE1B94-DAB5-E0E1-393B-5B4A1001C5F9}"/>
+              </a:ext>
+            </a:extLst>
+          </p:cNvPr>
+          <p:cNvSpPr/>
+          <p:nvPr/>
+        </p:nvSpPr>
+        <p:spPr>
+          <a:xfrm>
+            <a:off x="1416152" y="874900"/>
+            <a:ext cx="1725029" cy="287002"/>
+          </a:xfrm>
+          <a:prstGeom prst="rect">
+            <a:avLst/>
+          </a:prstGeom>
+          <a:solidFill>
+            <a:schemeClr val="accent1"/>
+          </a:solidFill>
+          <a:ln>
+            <a:solidFill>
+              <a:schemeClr val="accent1"/>
+            </a:solidFill>
+          </a:ln>
+        </p:spPr>
+        <p:style>
+          <a:lnRef idx="2">
+            <a:schemeClr val="accent1">
+              <a:shade val="15000"/>
+            </a:schemeClr>
+          </a:lnRef>
+          <a:fillRef idx="1">
+            <a:schemeClr val="accent1"/>
+          </a:fillRef>
+          <a:effectRef idx="0">
+            <a:schemeClr val="accent1"/>
+          </a:effectRef>
+          <a:fontRef idx="minor">
+            <a:schemeClr val="lt1"/>
+          </a:fontRef>
+        </p:style>
+        <p:txBody>
+          <a:bodyPr rtlCol="0" anchor="ctr"/>
+          <a:lstStyle/>
+          <a:p>
+            <a:pPr algn="ctr"/>
+            <a:endParaRPr lang="es-ES"/>
+          </a:p>
+        </p:txBody>
+      </p:sp>
+      <p:pic>
+        <p:nvPicPr>
+          <p:cNvPr id="3" name="Imagen 2" descr="Imagen en blanco y negro de un teclado de computadora&#10;&#10;Descripción generada automáticamente con confianza baja">
+            <a:extLst>
+              <a:ext uri="{FF2B5EF4-FFF2-40B4-BE49-F238E27FC236}">
+                <a16:creationId xmlns:a16="http://schemas.microsoft.com/office/drawing/2014/main" id="{E3C3F9E1-AB32-CA4F-9758-4D9D2AED87C3}"/>
+              </a:ext>
+            </a:extLst>
+          </p:cNvPr>
+          <p:cNvPicPr>
+            <a:picLocks noChangeAspect="1"/>
+          </p:cNvPicPr>
+          <p:nvPr/>
+        </p:nvPicPr>
+        <p:blipFill>
+          <a:blip r:embed="rId2"/>
+          <a:stretch>
+            <a:fillRect/>
+          </a:stretch>
+        </p:blipFill>
+        <p:spPr>
+          <a:xfrm>
+            <a:off x="61582" y="1179016"/>
+            <a:ext cx="1181252" cy="1586470"/>
+          </a:xfrm>
+          <a:prstGeom prst="rect">
+            <a:avLst/>
+          </a:prstGeom>
+        </p:spPr>
+      </p:pic>
+      <p:sp>
+        <p:nvSpPr>
+          <p:cNvPr id="4" name="CuadroTexto 3">
+            <a:extLst>
+              <a:ext uri="{FF2B5EF4-FFF2-40B4-BE49-F238E27FC236}">
+                <a16:creationId xmlns:a16="http://schemas.microsoft.com/office/drawing/2014/main" id="{0C57F9F7-6FC0-0139-A6C1-2E618F7C0A4C}"/>
+              </a:ext>
+            </a:extLst>
+          </p:cNvPr>
+          <p:cNvSpPr txBox="1"/>
+          <p:nvPr/>
+        </p:nvSpPr>
+        <p:spPr>
+          <a:xfrm>
+            <a:off x="1662952" y="891443"/>
+            <a:ext cx="1103187" cy="253916"/>
+          </a:xfrm>
+          <a:prstGeom prst="rect">
+            <a:avLst/>
+          </a:prstGeom>
+          <a:noFill/>
+        </p:spPr>
+        <p:txBody>
+          <a:bodyPr wrap="none" rtlCol="0">
+            <a:spAutoFit/>
+          </a:bodyPr>
+          <a:lstStyle/>
+          <a:p>
+            <a:pPr algn="r"/>
+            <a:r>
+              <a:rPr lang="es-ES" sz="1050" b="1" dirty="0">
+                <a:solidFill>
+                  <a:schemeClr val="bg1"/>
+                </a:solidFill>
+              </a:rPr>
+              <a:t>3 EN PROCESO</a:t>
+            </a:r>
+          </a:p>
+        </p:txBody>
+      </p:sp>
+      <p:sp>
+        <p:nvSpPr>
+          <p:cNvPr id="25" name="Rectángulo 24">
+            <a:extLst>
+              <a:ext uri="{FF2B5EF4-FFF2-40B4-BE49-F238E27FC236}">
+                <a16:creationId xmlns:a16="http://schemas.microsoft.com/office/drawing/2014/main" id="{B5AD3BB8-4FBB-388C-7E99-763975BC4D1F}"/>
+              </a:ext>
+            </a:extLst>
+          </p:cNvPr>
+          <p:cNvSpPr/>
+          <p:nvPr/>
+        </p:nvSpPr>
+        <p:spPr>
+          <a:xfrm>
+            <a:off x="3206765" y="1288472"/>
+            <a:ext cx="1725029" cy="2010705"/>
+          </a:xfrm>
+          <a:prstGeom prst="rect">
+            <a:avLst/>
+          </a:prstGeom>
+          <a:solidFill>
+            <a:schemeClr val="bg1"/>
+          </a:solidFill>
+          <a:ln w="9525">
+            <a:solidFill>
+              <a:schemeClr val="bg1">
+                <a:lumMod val="65000"/>
+              </a:schemeClr>
+            </a:solidFill>
+          </a:ln>
+        </p:spPr>
+        <p:style>
+          <a:lnRef idx="2">
+            <a:schemeClr val="accent1">
+              <a:shade val="15000"/>
+            </a:schemeClr>
+          </a:lnRef>
+          <a:fillRef idx="1">
+            <a:schemeClr val="accent1"/>
+          </a:fillRef>
+          <a:effectRef idx="0">
+            <a:schemeClr val="accent1"/>
+          </a:effectRef>
+          <a:fontRef idx="minor">
+            <a:schemeClr val="lt1"/>
+          </a:fontRef>
+        </p:style>
+        <p:txBody>
+          <a:bodyPr rtlCol="0" anchor="ctr"/>
+          <a:lstStyle/>
+          <a:p>
+            <a:pPr algn="ctr"/>
+            <a:endParaRPr lang="es-ES"/>
+          </a:p>
+        </p:txBody>
+      </p:sp>
+      <p:sp>
+        <p:nvSpPr>
+          <p:cNvPr id="27" name="Rectángulo 26">
+            <a:extLst>
+              <a:ext uri="{FF2B5EF4-FFF2-40B4-BE49-F238E27FC236}">
+                <a16:creationId xmlns:a16="http://schemas.microsoft.com/office/drawing/2014/main" id="{35606254-471C-0B9A-A764-DABF43F41395}"/>
+              </a:ext>
+            </a:extLst>
+          </p:cNvPr>
+          <p:cNvSpPr/>
+          <p:nvPr/>
+        </p:nvSpPr>
+        <p:spPr>
+          <a:xfrm>
+            <a:off x="1373757" y="3516269"/>
+            <a:ext cx="1725029" cy="287002"/>
+          </a:xfrm>
+          <a:prstGeom prst="rect">
+            <a:avLst/>
+          </a:prstGeom>
+          <a:solidFill>
+            <a:schemeClr val="bg1">
+              <a:lumMod val="85000"/>
+            </a:schemeClr>
+          </a:solidFill>
+          <a:ln>
+            <a:solidFill>
+              <a:schemeClr val="accent1"/>
+            </a:solidFill>
+          </a:ln>
+        </p:spPr>
+        <p:style>
+          <a:lnRef idx="2">
+            <a:schemeClr val="accent1">
+              <a:shade val="15000"/>
+            </a:schemeClr>
+          </a:lnRef>
+          <a:fillRef idx="1">
+            <a:schemeClr val="accent1"/>
+          </a:fillRef>
+          <a:effectRef idx="0">
+            <a:schemeClr val="accent1"/>
+          </a:effectRef>
+          <a:fontRef idx="minor">
+            <a:schemeClr val="lt1"/>
+          </a:fontRef>
+        </p:style>
+        <p:txBody>
+          <a:bodyPr rtlCol="0" anchor="ctr"/>
+          <a:lstStyle/>
+          <a:p>
+            <a:pPr algn="ctr"/>
+            <a:endParaRPr lang="es-ES"/>
+          </a:p>
+        </p:txBody>
+      </p:sp>
+      <p:sp>
+        <p:nvSpPr>
+          <p:cNvPr id="28" name="CuadroTexto 27">
+            <a:extLst>
+              <a:ext uri="{FF2B5EF4-FFF2-40B4-BE49-F238E27FC236}">
+                <a16:creationId xmlns:a16="http://schemas.microsoft.com/office/drawing/2014/main" id="{4CE1E7DE-2655-8F64-FB09-D14C0C0302F3}"/>
+              </a:ext>
+            </a:extLst>
+          </p:cNvPr>
+          <p:cNvSpPr txBox="1"/>
+          <p:nvPr/>
+        </p:nvSpPr>
+        <p:spPr>
+          <a:xfrm>
+            <a:off x="1649411" y="3532812"/>
+            <a:ext cx="1074333" cy="253916"/>
+          </a:xfrm>
+          <a:prstGeom prst="rect">
+            <a:avLst/>
+          </a:prstGeom>
+          <a:noFill/>
+        </p:spPr>
+        <p:txBody>
+          <a:bodyPr wrap="none" rtlCol="0">
+            <a:spAutoFit/>
+          </a:bodyPr>
+          <a:lstStyle/>
+          <a:p>
+            <a:pPr algn="r"/>
+            <a:r>
+              <a:rPr lang="es-ES" sz="1050" b="1" dirty="0"/>
+              <a:t>6 PENDIENTES</a:t>
+            </a:r>
+          </a:p>
+        </p:txBody>
+      </p:sp>
+      <p:sp>
+        <p:nvSpPr>
+          <p:cNvPr id="32" name="Rectángulo 31">
+            <a:extLst>
+              <a:ext uri="{FF2B5EF4-FFF2-40B4-BE49-F238E27FC236}">
+                <a16:creationId xmlns:a16="http://schemas.microsoft.com/office/drawing/2014/main" id="{A1A9C626-1DB0-F83D-6470-F19B1B48BD4F}"/>
+              </a:ext>
+            </a:extLst>
+          </p:cNvPr>
+          <p:cNvSpPr/>
+          <p:nvPr/>
+        </p:nvSpPr>
+        <p:spPr>
+          <a:xfrm>
+            <a:off x="1416152" y="3906582"/>
+            <a:ext cx="1725029" cy="2010705"/>
+          </a:xfrm>
+          <a:prstGeom prst="rect">
+            <a:avLst/>
+          </a:prstGeom>
+          <a:solidFill>
+            <a:schemeClr val="bg1"/>
+          </a:solidFill>
+          <a:ln w="9525">
+            <a:solidFill>
+              <a:schemeClr val="bg1">
+                <a:lumMod val="65000"/>
+              </a:schemeClr>
+            </a:solidFill>
+          </a:ln>
+        </p:spPr>
+        <p:style>
+          <a:lnRef idx="2">
+            <a:schemeClr val="accent1">
+              <a:shade val="15000"/>
+            </a:schemeClr>
+          </a:lnRef>
+          <a:fillRef idx="1">
+            <a:schemeClr val="accent1"/>
+          </a:fillRef>
+          <a:effectRef idx="0">
+            <a:schemeClr val="accent1"/>
+          </a:effectRef>
+          <a:fontRef idx="minor">
+            <a:schemeClr val="lt1"/>
+          </a:fontRef>
+        </p:style>
+        <p:txBody>
+          <a:bodyPr rtlCol="0" anchor="ctr"/>
+          <a:lstStyle/>
+          <a:p>
+            <a:pPr algn="ctr"/>
+            <a:endParaRPr lang="es-ES"/>
+          </a:p>
+        </p:txBody>
+      </p:sp>
+      <p:sp>
+        <p:nvSpPr>
+          <p:cNvPr id="33" name="Rectángulo 32">
+            <a:extLst>
+              <a:ext uri="{FF2B5EF4-FFF2-40B4-BE49-F238E27FC236}">
+                <a16:creationId xmlns:a16="http://schemas.microsoft.com/office/drawing/2014/main" id="{333A3914-251E-CE71-3CA4-9F995A5BD157}"/>
+              </a:ext>
+            </a:extLst>
+          </p:cNvPr>
+          <p:cNvSpPr/>
+          <p:nvPr/>
+        </p:nvSpPr>
+        <p:spPr>
+          <a:xfrm>
+            <a:off x="3206765" y="3906581"/>
+            <a:ext cx="1725029" cy="2010705"/>
+          </a:xfrm>
+          <a:prstGeom prst="rect">
+            <a:avLst/>
+          </a:prstGeom>
+          <a:solidFill>
+            <a:schemeClr val="bg1"/>
+          </a:solidFill>
+          <a:ln w="9525">
+            <a:solidFill>
+              <a:schemeClr val="bg1">
+                <a:lumMod val="65000"/>
+              </a:schemeClr>
+            </a:solidFill>
+          </a:ln>
+        </p:spPr>
+        <p:style>
+          <a:lnRef idx="2">
+            <a:schemeClr val="accent1">
+              <a:shade val="15000"/>
+            </a:schemeClr>
+          </a:lnRef>
+          <a:fillRef idx="1">
+            <a:schemeClr val="accent1"/>
+          </a:fillRef>
+          <a:effectRef idx="0">
+            <a:schemeClr val="accent1"/>
+          </a:effectRef>
+          <a:fontRef idx="minor">
+            <a:schemeClr val="lt1"/>
+          </a:fontRef>
+        </p:style>
+        <p:txBody>
+          <a:bodyPr rtlCol="0" anchor="ctr"/>
+          <a:lstStyle/>
+          <a:p>
+            <a:pPr algn="ctr"/>
+            <a:endParaRPr lang="es-ES"/>
+          </a:p>
+        </p:txBody>
+      </p:sp>
+      <p:sp>
+        <p:nvSpPr>
+          <p:cNvPr id="35" name="Rectángulo 34">
+            <a:extLst>
+              <a:ext uri="{FF2B5EF4-FFF2-40B4-BE49-F238E27FC236}">
+                <a16:creationId xmlns:a16="http://schemas.microsoft.com/office/drawing/2014/main" id="{9B51428E-ECAF-AD48-B208-E3E7DF85C155}"/>
+              </a:ext>
+            </a:extLst>
+          </p:cNvPr>
+          <p:cNvSpPr/>
+          <p:nvPr/>
+        </p:nvSpPr>
+        <p:spPr>
+          <a:xfrm>
+            <a:off x="4997378" y="3890039"/>
+            <a:ext cx="1725029" cy="2010705"/>
+          </a:xfrm>
+          <a:prstGeom prst="rect">
+            <a:avLst/>
+          </a:prstGeom>
+          <a:solidFill>
+            <a:schemeClr val="bg1"/>
+          </a:solidFill>
+          <a:ln w="9525">
+            <a:solidFill>
+              <a:schemeClr val="bg1">
+                <a:lumMod val="65000"/>
+              </a:schemeClr>
+            </a:solidFill>
+          </a:ln>
+        </p:spPr>
+        <p:style>
+          <a:lnRef idx="2">
+            <a:schemeClr val="accent1">
+              <a:shade val="15000"/>
+            </a:schemeClr>
+          </a:lnRef>
+          <a:fillRef idx="1">
+            <a:schemeClr val="accent1"/>
+          </a:fillRef>
+          <a:effectRef idx="0">
+            <a:schemeClr val="accent1"/>
+          </a:effectRef>
+          <a:fontRef idx="minor">
+            <a:schemeClr val="lt1"/>
+          </a:fontRef>
+        </p:style>
+        <p:txBody>
+          <a:bodyPr rtlCol="0" anchor="ctr"/>
+          <a:lstStyle/>
+          <a:p>
+            <a:pPr algn="ctr"/>
+            <a:endParaRPr lang="es-ES"/>
+          </a:p>
+        </p:txBody>
+      </p:sp>
+      <p:sp>
+        <p:nvSpPr>
+          <p:cNvPr id="36" name="Rectángulo 35">
+            <a:extLst>
+              <a:ext uri="{FF2B5EF4-FFF2-40B4-BE49-F238E27FC236}">
+                <a16:creationId xmlns:a16="http://schemas.microsoft.com/office/drawing/2014/main" id="{10DC9780-ECFC-8CF2-1034-A7D591BBB1F5}"/>
+              </a:ext>
+            </a:extLst>
+          </p:cNvPr>
+          <p:cNvSpPr/>
+          <p:nvPr/>
+        </p:nvSpPr>
+        <p:spPr>
+          <a:xfrm>
+            <a:off x="6787991" y="3890038"/>
+            <a:ext cx="1725029" cy="2010705"/>
+          </a:xfrm>
+          <a:prstGeom prst="rect">
+            <a:avLst/>
+          </a:prstGeom>
+          <a:solidFill>
+            <a:schemeClr val="bg1"/>
+          </a:solidFill>
+          <a:ln w="9525">
+            <a:solidFill>
+              <a:schemeClr val="bg1">
+                <a:lumMod val="65000"/>
+              </a:schemeClr>
+            </a:solidFill>
+          </a:ln>
+        </p:spPr>
+        <p:style>
+          <a:lnRef idx="2">
+            <a:schemeClr val="accent1">
+              <a:shade val="15000"/>
+            </a:schemeClr>
+          </a:lnRef>
+          <a:fillRef idx="1">
+            <a:schemeClr val="accent1"/>
+          </a:fillRef>
+          <a:effectRef idx="0">
+            <a:schemeClr val="accent1"/>
+          </a:effectRef>
+          <a:fontRef idx="minor">
+            <a:schemeClr val="lt1"/>
+          </a:fontRef>
+        </p:style>
+        <p:txBody>
+          <a:bodyPr rtlCol="0" anchor="ctr"/>
+          <a:lstStyle/>
+          <a:p>
+            <a:pPr algn="ctr"/>
+            <a:endParaRPr lang="es-ES"/>
+          </a:p>
+        </p:txBody>
+      </p:sp>
+      <p:sp>
+        <p:nvSpPr>
+          <p:cNvPr id="37" name="Rectángulo 36">
+            <a:extLst>
+              <a:ext uri="{FF2B5EF4-FFF2-40B4-BE49-F238E27FC236}">
+                <a16:creationId xmlns:a16="http://schemas.microsoft.com/office/drawing/2014/main" id="{A26D3EBB-CFC2-6831-3D0B-CA7D1C3FF581}"/>
+              </a:ext>
+            </a:extLst>
+          </p:cNvPr>
+          <p:cNvSpPr/>
+          <p:nvPr/>
+        </p:nvSpPr>
+        <p:spPr>
+          <a:xfrm>
+            <a:off x="8600621" y="3890036"/>
+            <a:ext cx="1725029" cy="2010705"/>
+          </a:xfrm>
+          <a:prstGeom prst="rect">
+            <a:avLst/>
+          </a:prstGeom>
+          <a:solidFill>
+            <a:schemeClr val="bg1"/>
+          </a:solidFill>
+          <a:ln w="9525">
+            <a:solidFill>
+              <a:schemeClr val="bg1">
+                <a:lumMod val="65000"/>
+              </a:schemeClr>
+            </a:solidFill>
+          </a:ln>
+        </p:spPr>
+        <p:style>
+          <a:lnRef idx="2">
+            <a:schemeClr val="accent1">
+              <a:shade val="15000"/>
+            </a:schemeClr>
+          </a:lnRef>
+          <a:fillRef idx="1">
+            <a:schemeClr val="accent1"/>
+          </a:fillRef>
+          <a:effectRef idx="0">
+            <a:schemeClr val="accent1"/>
+          </a:effectRef>
+          <a:fontRef idx="minor">
+            <a:schemeClr val="lt1"/>
+          </a:fontRef>
+        </p:style>
+        <p:txBody>
+          <a:bodyPr rtlCol="0" anchor="ctr"/>
+          <a:lstStyle/>
+          <a:p>
+            <a:pPr algn="ctr"/>
+            <a:endParaRPr lang="es-ES"/>
+          </a:p>
+        </p:txBody>
+      </p:sp>
+      <p:sp>
+        <p:nvSpPr>
+          <p:cNvPr id="38" name="Rectángulo 37">
+            <a:extLst>
+              <a:ext uri="{FF2B5EF4-FFF2-40B4-BE49-F238E27FC236}">
+                <a16:creationId xmlns:a16="http://schemas.microsoft.com/office/drawing/2014/main" id="{7209EE3A-9521-2925-B5D1-28210F484D94}"/>
+              </a:ext>
+            </a:extLst>
+          </p:cNvPr>
+          <p:cNvSpPr/>
+          <p:nvPr/>
+        </p:nvSpPr>
+        <p:spPr>
+          <a:xfrm>
+            <a:off x="10388423" y="3890036"/>
+            <a:ext cx="1725029" cy="2010705"/>
+          </a:xfrm>
+          <a:prstGeom prst="rect">
+            <a:avLst/>
+          </a:prstGeom>
+          <a:solidFill>
+            <a:schemeClr val="bg1"/>
+          </a:solidFill>
+          <a:ln w="9525">
+            <a:solidFill>
+              <a:schemeClr val="bg1">
+                <a:lumMod val="65000"/>
+              </a:schemeClr>
+            </a:solidFill>
+          </a:ln>
+        </p:spPr>
+        <p:style>
+          <a:lnRef idx="2">
+            <a:schemeClr val="accent1">
+              <a:shade val="15000"/>
+            </a:schemeClr>
+          </a:lnRef>
+          <a:fillRef idx="1">
+            <a:schemeClr val="accent1"/>
+          </a:fillRef>
+          <a:effectRef idx="0">
+            <a:schemeClr val="accent1"/>
+          </a:effectRef>
+          <a:fontRef idx="minor">
+            <a:schemeClr val="lt1"/>
+          </a:fontRef>
+        </p:style>
+        <p:txBody>
+          <a:bodyPr rtlCol="0" anchor="ctr"/>
+          <a:lstStyle/>
+          <a:p>
+            <a:pPr algn="ctr"/>
+            <a:endParaRPr lang="es-ES"/>
+          </a:p>
+        </p:txBody>
+      </p:sp>
+      <p:sp>
+        <p:nvSpPr>
+          <p:cNvPr id="39" name="CuadroTexto 38">
+            <a:extLst>
+              <a:ext uri="{FF2B5EF4-FFF2-40B4-BE49-F238E27FC236}">
+                <a16:creationId xmlns:a16="http://schemas.microsoft.com/office/drawing/2014/main" id="{C92CDC6E-DB9E-51D1-013F-B9268B7D9A73}"/>
+              </a:ext>
+            </a:extLst>
+          </p:cNvPr>
+          <p:cNvSpPr txBox="1"/>
+          <p:nvPr/>
+        </p:nvSpPr>
+        <p:spPr>
+          <a:xfrm>
+            <a:off x="3742907" y="1328123"/>
+            <a:ext cx="652743" cy="215444"/>
+          </a:xfrm>
+          <a:prstGeom prst="rect">
+            <a:avLst/>
+          </a:prstGeom>
+          <a:noFill/>
+        </p:spPr>
+        <p:txBody>
+          <a:bodyPr wrap="none" rtlCol="0">
+            <a:spAutoFit/>
+          </a:bodyPr>
+          <a:lstStyle/>
+          <a:p>
+            <a:r>
+              <a:rPr lang="es-ES" sz="800" dirty="0"/>
+              <a:t>ORDEN #2</a:t>
+            </a:r>
+          </a:p>
+        </p:txBody>
+      </p:sp>
+      <p:sp>
+        <p:nvSpPr>
+          <p:cNvPr id="40" name="CuadroTexto 39">
+            <a:extLst>
+              <a:ext uri="{FF2B5EF4-FFF2-40B4-BE49-F238E27FC236}">
+                <a16:creationId xmlns:a16="http://schemas.microsoft.com/office/drawing/2014/main" id="{A4A95ACA-6CB4-A35A-1A7F-55048F5C7876}"/>
+              </a:ext>
+            </a:extLst>
+          </p:cNvPr>
+          <p:cNvSpPr txBox="1"/>
+          <p:nvPr/>
+        </p:nvSpPr>
+        <p:spPr>
+          <a:xfrm>
+            <a:off x="1425578" y="1387674"/>
+            <a:ext cx="527709" cy="215444"/>
+          </a:xfrm>
+          <a:prstGeom prst="rect">
+            <a:avLst/>
+          </a:prstGeom>
+          <a:noFill/>
+        </p:spPr>
+        <p:txBody>
+          <a:bodyPr wrap="none" rtlCol="0">
+            <a:spAutoFit/>
+          </a:bodyPr>
+          <a:lstStyle/>
+          <a:p>
+            <a:r>
+              <a:rPr lang="es-ES" sz="800" b="1" dirty="0"/>
+              <a:t>9:30AM</a:t>
+            </a:r>
+          </a:p>
+        </p:txBody>
+      </p:sp>
+      <p:sp>
+        <p:nvSpPr>
+          <p:cNvPr id="41" name="CuadroTexto 40">
+            <a:extLst>
+              <a:ext uri="{FF2B5EF4-FFF2-40B4-BE49-F238E27FC236}">
+                <a16:creationId xmlns:a16="http://schemas.microsoft.com/office/drawing/2014/main" id="{518C3E0D-0B03-9F84-2AD5-DB3CF3F0FE81}"/>
+              </a:ext>
+            </a:extLst>
+          </p:cNvPr>
+          <p:cNvSpPr txBox="1"/>
+          <p:nvPr/>
+        </p:nvSpPr>
+        <p:spPr>
+          <a:xfrm>
+            <a:off x="2567529" y="1387674"/>
+            <a:ext cx="463588" cy="215444"/>
+          </a:xfrm>
+          <a:prstGeom prst="rect">
+            <a:avLst/>
+          </a:prstGeom>
+          <a:noFill/>
+        </p:spPr>
+        <p:txBody>
+          <a:bodyPr wrap="none" rtlCol="0">
+            <a:spAutoFit/>
+          </a:bodyPr>
+          <a:lstStyle/>
+          <a:p>
+            <a:r>
+              <a:rPr lang="es-ES" sz="800" b="1" dirty="0"/>
+              <a:t>1:45M</a:t>
+            </a:r>
+          </a:p>
+        </p:txBody>
+      </p:sp>
+      <p:cxnSp>
+        <p:nvCxnSpPr>
+          <p:cNvPr id="43" name="Conector recto de flecha 42">
+            <a:extLst>
+              <a:ext uri="{FF2B5EF4-FFF2-40B4-BE49-F238E27FC236}">
+                <a16:creationId xmlns:a16="http://schemas.microsoft.com/office/drawing/2014/main" id="{20F96ED4-6B6A-F485-4FDB-751B6C3673F7}"/>
+              </a:ext>
+            </a:extLst>
+          </p:cNvPr>
+          <p:cNvCxnSpPr/>
+          <p:nvPr/>
+        </p:nvCxnSpPr>
+        <p:spPr>
+          <a:xfrm>
+            <a:off x="1529571" y="1387674"/>
+            <a:ext cx="255777" cy="0"/>
+          </a:xfrm>
+          <a:prstGeom prst="straightConnector1">
+            <a:avLst/>
+          </a:prstGeom>
+          <a:ln>
+            <a:tailEnd type="triangle"/>
+          </a:ln>
+        </p:spPr>
+        <p:style>
+          <a:lnRef idx="2">
+            <a:schemeClr val="accent1"/>
+          </a:lnRef>
+          <a:fillRef idx="0">
+            <a:schemeClr val="accent1"/>
+          </a:fillRef>
+          <a:effectRef idx="1">
+            <a:schemeClr val="accent1"/>
+          </a:effectRef>
+          <a:fontRef idx="minor">
+            <a:schemeClr val="tx1"/>
+          </a:fontRef>
+        </p:style>
+      </p:cxnSp>
+      <p:cxnSp>
+        <p:nvCxnSpPr>
+          <p:cNvPr id="45" name="Conector recto de flecha 44">
+            <a:extLst>
+              <a:ext uri="{FF2B5EF4-FFF2-40B4-BE49-F238E27FC236}">
+                <a16:creationId xmlns:a16="http://schemas.microsoft.com/office/drawing/2014/main" id="{13FD87F1-B8CB-AD94-6BE4-FD4F548F479F}"/>
+              </a:ext>
+            </a:extLst>
+          </p:cNvPr>
+          <p:cNvCxnSpPr/>
+          <p:nvPr/>
+        </p:nvCxnSpPr>
+        <p:spPr>
+          <a:xfrm>
+            <a:off x="2679117" y="1387674"/>
+            <a:ext cx="255777" cy="0"/>
+          </a:xfrm>
+          <a:prstGeom prst="straightConnector1">
+            <a:avLst/>
+          </a:prstGeom>
+          <a:ln>
+            <a:tailEnd type="triangle"/>
+          </a:ln>
+        </p:spPr>
+        <p:style>
+          <a:lnRef idx="2">
+            <a:schemeClr val="accent1"/>
+          </a:lnRef>
+          <a:fillRef idx="0">
+            <a:schemeClr val="accent1"/>
+          </a:fillRef>
+          <a:effectRef idx="1">
+            <a:schemeClr val="accent1"/>
+          </a:effectRef>
+          <a:fontRef idx="minor">
+            <a:schemeClr val="tx1"/>
+          </a:fontRef>
+        </p:style>
+      </p:cxnSp>
+      <p:cxnSp>
+        <p:nvCxnSpPr>
+          <p:cNvPr id="46" name="Conector recto 45">
+            <a:extLst>
+              <a:ext uri="{FF2B5EF4-FFF2-40B4-BE49-F238E27FC236}">
+                <a16:creationId xmlns:a16="http://schemas.microsoft.com/office/drawing/2014/main" id="{B5A10B62-1D91-F264-A5EA-20FF4D7FD09F}"/>
+              </a:ext>
+            </a:extLst>
+          </p:cNvPr>
+          <p:cNvCxnSpPr>
+            <a:cxnSpLocks/>
+          </p:cNvCxnSpPr>
+          <p:nvPr/>
+        </p:nvCxnSpPr>
+        <p:spPr>
+          <a:xfrm>
+            <a:off x="1459424" y="1603118"/>
+            <a:ext cx="1571693" cy="0"/>
+          </a:xfrm>
+          <a:prstGeom prst="line">
+            <a:avLst/>
+          </a:prstGeom>
+          <a:ln w="6350"/>
+        </p:spPr>
+        <p:style>
+          <a:lnRef idx="2">
+            <a:schemeClr val="accent1"/>
+          </a:lnRef>
+          <a:fillRef idx="0">
+            <a:schemeClr val="accent1"/>
+          </a:fillRef>
+          <a:effectRef idx="1">
+            <a:schemeClr val="accent1"/>
+          </a:effectRef>
+          <a:fontRef idx="minor">
+            <a:schemeClr val="tx1"/>
+          </a:fontRef>
+        </p:style>
+      </p:cxnSp>
+      <p:sp>
+        <p:nvSpPr>
+          <p:cNvPr id="49" name="CuadroTexto 48">
+            <a:extLst>
+              <a:ext uri="{FF2B5EF4-FFF2-40B4-BE49-F238E27FC236}">
+                <a16:creationId xmlns:a16="http://schemas.microsoft.com/office/drawing/2014/main" id="{A03A6254-27D5-AE90-444F-0FD1C161CEE6}"/>
+              </a:ext>
+            </a:extLst>
+          </p:cNvPr>
+          <p:cNvSpPr txBox="1"/>
+          <p:nvPr/>
+        </p:nvSpPr>
+        <p:spPr>
+          <a:xfrm>
+            <a:off x="1615358" y="1633697"/>
+            <a:ext cx="939681" cy="338554"/>
+          </a:xfrm>
+          <a:prstGeom prst="rect">
+            <a:avLst/>
+          </a:prstGeom>
+          <a:noFill/>
+        </p:spPr>
+        <p:txBody>
+          <a:bodyPr wrap="none" rtlCol="0">
+            <a:spAutoFit/>
+          </a:bodyPr>
+          <a:lstStyle/>
+          <a:p>
+            <a:r>
+              <a:rPr lang="es-ES" sz="800" dirty="0"/>
+              <a:t>CAUSA RELLENA</a:t>
+            </a:r>
+          </a:p>
+          <a:p>
+            <a:r>
+              <a:rPr lang="es-ES" sz="800" dirty="0"/>
+              <a:t>X 1</a:t>
+            </a:r>
+          </a:p>
+        </p:txBody>
+      </p:sp>
+      <p:sp>
+        <p:nvSpPr>
+          <p:cNvPr id="51" name="Rectángulo 50">
+            <a:extLst>
+              <a:ext uri="{FF2B5EF4-FFF2-40B4-BE49-F238E27FC236}">
+                <a16:creationId xmlns:a16="http://schemas.microsoft.com/office/drawing/2014/main" id="{804261B2-E19E-2AE4-CED0-9ABB3B29C724}"/>
+              </a:ext>
+            </a:extLst>
+          </p:cNvPr>
+          <p:cNvSpPr/>
+          <p:nvPr/>
+        </p:nvSpPr>
+        <p:spPr>
+          <a:xfrm>
+            <a:off x="1436252" y="1678573"/>
+            <a:ext cx="223134" cy="215445"/>
+          </a:xfrm>
+          <a:prstGeom prst="rect">
+            <a:avLst/>
+          </a:prstGeom>
+          <a:solidFill>
+            <a:schemeClr val="bg1">
+              <a:lumMod val="85000"/>
+            </a:schemeClr>
+          </a:solidFill>
+          <a:ln>
+            <a:solidFill>
+              <a:schemeClr val="bg1">
+                <a:lumMod val="65000"/>
+              </a:schemeClr>
+            </a:solidFill>
+          </a:ln>
+        </p:spPr>
+        <p:style>
+          <a:lnRef idx="2">
+            <a:schemeClr val="accent1">
+              <a:shade val="15000"/>
+            </a:schemeClr>
+          </a:lnRef>
+          <a:fillRef idx="1">
+            <a:schemeClr val="accent1"/>
+          </a:fillRef>
+          <a:effectRef idx="0">
+            <a:schemeClr val="accent1"/>
+          </a:effectRef>
+          <a:fontRef idx="minor">
+            <a:schemeClr val="lt1"/>
+          </a:fontRef>
+        </p:style>
+        <p:txBody>
+          <a:bodyPr rtlCol="0" anchor="ctr"/>
+          <a:lstStyle/>
+          <a:p>
+            <a:pPr algn="ctr"/>
+            <a:endParaRPr lang="es-ES"/>
+          </a:p>
+        </p:txBody>
+      </p:sp>
+      <p:sp>
+        <p:nvSpPr>
+          <p:cNvPr id="52" name="CuadroTexto 51">
+            <a:extLst>
+              <a:ext uri="{FF2B5EF4-FFF2-40B4-BE49-F238E27FC236}">
+                <a16:creationId xmlns:a16="http://schemas.microsoft.com/office/drawing/2014/main" id="{6C3E6DC4-3252-F6AD-0079-B03923CE19D3}"/>
+              </a:ext>
+            </a:extLst>
+          </p:cNvPr>
+          <p:cNvSpPr txBox="1"/>
+          <p:nvPr/>
+        </p:nvSpPr>
+        <p:spPr>
+          <a:xfrm>
+            <a:off x="1612461" y="1946315"/>
+            <a:ext cx="909223" cy="338554"/>
+          </a:xfrm>
+          <a:prstGeom prst="rect">
+            <a:avLst/>
+          </a:prstGeom>
+          <a:noFill/>
+        </p:spPr>
+        <p:txBody>
+          <a:bodyPr wrap="none" rtlCol="0">
+            <a:spAutoFit/>
+          </a:bodyPr>
+          <a:lstStyle/>
+          <a:p>
+            <a:r>
+              <a:rPr lang="es-ES" sz="800" dirty="0"/>
+              <a:t>ARROZ CHAUFA</a:t>
+            </a:r>
+          </a:p>
+          <a:p>
+            <a:r>
+              <a:rPr lang="es-ES" sz="800" dirty="0"/>
+              <a:t>X 1</a:t>
+            </a:r>
+          </a:p>
+        </p:txBody>
+      </p:sp>
+      <p:sp>
+        <p:nvSpPr>
+          <p:cNvPr id="53" name="Rectángulo 52">
+            <a:extLst>
+              <a:ext uri="{FF2B5EF4-FFF2-40B4-BE49-F238E27FC236}">
+                <a16:creationId xmlns:a16="http://schemas.microsoft.com/office/drawing/2014/main" id="{912D3CE0-A6B4-F500-AFF0-8836197486AE}"/>
+              </a:ext>
+            </a:extLst>
+          </p:cNvPr>
+          <p:cNvSpPr/>
+          <p:nvPr/>
+        </p:nvSpPr>
+        <p:spPr>
+          <a:xfrm>
+            <a:off x="1433355" y="1976260"/>
+            <a:ext cx="223134" cy="215445"/>
+          </a:xfrm>
+          <a:prstGeom prst="rect">
+            <a:avLst/>
+          </a:prstGeom>
+          <a:solidFill>
+            <a:schemeClr val="bg1">
+              <a:lumMod val="85000"/>
+            </a:schemeClr>
+          </a:solidFill>
+          <a:ln>
+            <a:solidFill>
+              <a:schemeClr val="bg1">
+                <a:lumMod val="65000"/>
+              </a:schemeClr>
+            </a:solidFill>
+          </a:ln>
+        </p:spPr>
+        <p:style>
+          <a:lnRef idx="2">
+            <a:schemeClr val="accent1">
+              <a:shade val="15000"/>
+            </a:schemeClr>
+          </a:lnRef>
+          <a:fillRef idx="1">
+            <a:schemeClr val="accent1"/>
+          </a:fillRef>
+          <a:effectRef idx="0">
+            <a:schemeClr val="accent1"/>
+          </a:effectRef>
+          <a:fontRef idx="minor">
+            <a:schemeClr val="lt1"/>
+          </a:fontRef>
+        </p:style>
+        <p:txBody>
+          <a:bodyPr rtlCol="0" anchor="ctr"/>
+          <a:lstStyle/>
+          <a:p>
+            <a:pPr algn="ctr"/>
+            <a:endParaRPr lang="es-ES"/>
+          </a:p>
+        </p:txBody>
+      </p:sp>
+      <p:sp>
+        <p:nvSpPr>
+          <p:cNvPr id="54" name="CuadroTexto 53">
+            <a:extLst>
+              <a:ext uri="{FF2B5EF4-FFF2-40B4-BE49-F238E27FC236}">
+                <a16:creationId xmlns:a16="http://schemas.microsoft.com/office/drawing/2014/main" id="{2785DC30-8D3A-06D9-04C3-5725CD8EE6E7}"/>
+              </a:ext>
+            </a:extLst>
+          </p:cNvPr>
+          <p:cNvSpPr txBox="1"/>
+          <p:nvPr/>
+        </p:nvSpPr>
+        <p:spPr>
+          <a:xfrm>
+            <a:off x="1317712" y="1685655"/>
+            <a:ext cx="439544" cy="215444"/>
+          </a:xfrm>
+          <a:prstGeom prst="rect">
+            <a:avLst/>
+          </a:prstGeom>
+          <a:noFill/>
+        </p:spPr>
+        <p:txBody>
+          <a:bodyPr wrap="square" rtlCol="0">
+            <a:spAutoFit/>
+          </a:bodyPr>
+          <a:lstStyle/>
+          <a:p>
+            <a:r>
+              <a:rPr lang="es-ES" sz="800" dirty="0"/>
+              <a:t>FOTO</a:t>
+            </a:r>
+          </a:p>
+        </p:txBody>
+      </p:sp>
+      <p:sp>
+        <p:nvSpPr>
+          <p:cNvPr id="56" name="CuadroTexto 55">
+            <a:extLst>
+              <a:ext uri="{FF2B5EF4-FFF2-40B4-BE49-F238E27FC236}">
+                <a16:creationId xmlns:a16="http://schemas.microsoft.com/office/drawing/2014/main" id="{C33F3044-1EF4-0C47-1D1D-169F199DE02F}"/>
+              </a:ext>
+            </a:extLst>
+          </p:cNvPr>
+          <p:cNvSpPr txBox="1"/>
+          <p:nvPr/>
+        </p:nvSpPr>
+        <p:spPr>
+          <a:xfrm>
+            <a:off x="1331527" y="1977893"/>
+            <a:ext cx="439544" cy="215444"/>
+          </a:xfrm>
+          <a:prstGeom prst="rect">
+            <a:avLst/>
+          </a:prstGeom>
+          <a:noFill/>
+        </p:spPr>
+        <p:txBody>
+          <a:bodyPr wrap="square" rtlCol="0">
+            <a:spAutoFit/>
+          </a:bodyPr>
+          <a:lstStyle/>
+          <a:p>
+            <a:r>
+              <a:rPr lang="es-ES" sz="800" dirty="0"/>
+              <a:t>FOTO</a:t>
+            </a:r>
+          </a:p>
+        </p:txBody>
+      </p:sp>
+      <p:sp>
+        <p:nvSpPr>
+          <p:cNvPr id="57" name="Rectángulo 56">
+            <a:extLst>
+              <a:ext uri="{FF2B5EF4-FFF2-40B4-BE49-F238E27FC236}">
+                <a16:creationId xmlns:a16="http://schemas.microsoft.com/office/drawing/2014/main" id="{94414D94-691A-19C3-1E4E-67831E3238EE}"/>
+              </a:ext>
+            </a:extLst>
+          </p:cNvPr>
+          <p:cNvSpPr/>
+          <p:nvPr/>
+        </p:nvSpPr>
+        <p:spPr>
+          <a:xfrm>
+            <a:off x="2635138" y="1665543"/>
+            <a:ext cx="242819" cy="210409"/>
+          </a:xfrm>
+          <a:prstGeom prst="rect">
+            <a:avLst/>
+          </a:prstGeom>
+          <a:solidFill>
+            <a:schemeClr val="bg1">
+              <a:lumMod val="85000"/>
+            </a:schemeClr>
+          </a:solidFill>
+          <a:ln>
+            <a:solidFill>
+              <a:schemeClr val="accent1"/>
+            </a:solidFill>
+          </a:ln>
+        </p:spPr>
+        <p:style>
+          <a:lnRef idx="2">
+            <a:schemeClr val="accent1">
+              <a:shade val="15000"/>
+            </a:schemeClr>
+          </a:lnRef>
+          <a:fillRef idx="1">
+            <a:schemeClr val="accent1"/>
+          </a:fillRef>
+          <a:effectRef idx="0">
+            <a:schemeClr val="accent1"/>
+          </a:effectRef>
+          <a:fontRef idx="minor">
+            <a:schemeClr val="lt1"/>
+          </a:fontRef>
+        </p:style>
+        <p:txBody>
+          <a:bodyPr rtlCol="0" anchor="ctr"/>
+          <a:lstStyle/>
+          <a:p>
+            <a:pPr algn="ctr"/>
+            <a:endParaRPr lang="es-ES"/>
+          </a:p>
+        </p:txBody>
+      </p:sp>
+      <p:sp>
+        <p:nvSpPr>
+          <p:cNvPr id="58" name="Rectángulo 57">
+            <a:extLst>
+              <a:ext uri="{FF2B5EF4-FFF2-40B4-BE49-F238E27FC236}">
+                <a16:creationId xmlns:a16="http://schemas.microsoft.com/office/drawing/2014/main" id="{2E9CFEE8-4D58-C36F-CD49-AB1656996CE0}"/>
+              </a:ext>
+            </a:extLst>
+          </p:cNvPr>
+          <p:cNvSpPr/>
+          <p:nvPr/>
+        </p:nvSpPr>
+        <p:spPr>
+          <a:xfrm>
+            <a:off x="2919812" y="1665543"/>
+            <a:ext cx="170016" cy="210409"/>
+          </a:xfrm>
+          <a:prstGeom prst="rect">
+            <a:avLst/>
+          </a:prstGeom>
+          <a:solidFill>
+            <a:srgbClr val="FF0000"/>
+          </a:solidFill>
+          <a:ln>
+            <a:solidFill>
+              <a:srgbClr val="FF0000"/>
+            </a:solidFill>
+          </a:ln>
+        </p:spPr>
+        <p:style>
+          <a:lnRef idx="2">
+            <a:schemeClr val="accent1">
+              <a:shade val="15000"/>
+            </a:schemeClr>
+          </a:lnRef>
+          <a:fillRef idx="1">
+            <a:schemeClr val="accent1"/>
+          </a:fillRef>
+          <a:effectRef idx="0">
+            <a:schemeClr val="accent1"/>
+          </a:effectRef>
+          <a:fontRef idx="minor">
+            <a:schemeClr val="lt1"/>
+          </a:fontRef>
+        </p:style>
+        <p:txBody>
+          <a:bodyPr rtlCol="0" anchor="ctr"/>
+          <a:lstStyle/>
+          <a:p>
+            <a:pPr algn="ctr"/>
+            <a:endParaRPr lang="es-ES"/>
+          </a:p>
+        </p:txBody>
+      </p:sp>
+      <p:sp>
+        <p:nvSpPr>
+          <p:cNvPr id="59" name="Rectángulo 58">
+            <a:extLst>
+              <a:ext uri="{FF2B5EF4-FFF2-40B4-BE49-F238E27FC236}">
+                <a16:creationId xmlns:a16="http://schemas.microsoft.com/office/drawing/2014/main" id="{01B9D35D-5676-238A-7821-6DA33D952CE4}"/>
+              </a:ext>
+            </a:extLst>
+          </p:cNvPr>
+          <p:cNvSpPr/>
+          <p:nvPr/>
+        </p:nvSpPr>
+        <p:spPr>
+          <a:xfrm>
+            <a:off x="2633685" y="1964416"/>
+            <a:ext cx="242819" cy="210409"/>
+          </a:xfrm>
+          <a:prstGeom prst="rect">
+            <a:avLst/>
+          </a:prstGeom>
+          <a:solidFill>
+            <a:schemeClr val="bg1">
+              <a:lumMod val="85000"/>
+            </a:schemeClr>
+          </a:solidFill>
+          <a:ln>
+            <a:solidFill>
+              <a:schemeClr val="accent1"/>
+            </a:solidFill>
+          </a:ln>
+        </p:spPr>
+        <p:style>
+          <a:lnRef idx="2">
+            <a:schemeClr val="accent1">
+              <a:shade val="15000"/>
+            </a:schemeClr>
+          </a:lnRef>
+          <a:fillRef idx="1">
+            <a:schemeClr val="accent1"/>
+          </a:fillRef>
+          <a:effectRef idx="0">
+            <a:schemeClr val="accent1"/>
+          </a:effectRef>
+          <a:fontRef idx="minor">
+            <a:schemeClr val="lt1"/>
+          </a:fontRef>
+        </p:style>
+        <p:txBody>
+          <a:bodyPr rtlCol="0" anchor="ctr"/>
+          <a:lstStyle/>
+          <a:p>
+            <a:pPr algn="ctr"/>
+            <a:endParaRPr lang="es-ES"/>
+          </a:p>
+        </p:txBody>
+      </p:sp>
+      <p:sp>
+        <p:nvSpPr>
+          <p:cNvPr id="60" name="Rectángulo 59">
+            <a:extLst>
+              <a:ext uri="{FF2B5EF4-FFF2-40B4-BE49-F238E27FC236}">
+                <a16:creationId xmlns:a16="http://schemas.microsoft.com/office/drawing/2014/main" id="{A8D6DAC3-7174-9DD5-C6A2-A069610D03BA}"/>
+              </a:ext>
+            </a:extLst>
+          </p:cNvPr>
+          <p:cNvSpPr/>
+          <p:nvPr/>
+        </p:nvSpPr>
+        <p:spPr>
+          <a:xfrm>
+            <a:off x="2918359" y="1964416"/>
+            <a:ext cx="170016" cy="210409"/>
+          </a:xfrm>
+          <a:prstGeom prst="rect">
+            <a:avLst/>
+          </a:prstGeom>
+          <a:solidFill>
+            <a:srgbClr val="FF0000"/>
+          </a:solidFill>
+          <a:ln>
+            <a:solidFill>
+              <a:srgbClr val="FF0000"/>
+            </a:solidFill>
+          </a:ln>
+        </p:spPr>
+        <p:style>
+          <a:lnRef idx="2">
+            <a:schemeClr val="accent1">
+              <a:shade val="15000"/>
+            </a:schemeClr>
+          </a:lnRef>
+          <a:fillRef idx="1">
+            <a:schemeClr val="accent1"/>
+          </a:fillRef>
+          <a:effectRef idx="0">
+            <a:schemeClr val="accent1"/>
+          </a:effectRef>
+          <a:fontRef idx="minor">
+            <a:schemeClr val="lt1"/>
+          </a:fontRef>
+        </p:style>
+        <p:txBody>
+          <a:bodyPr rtlCol="0" anchor="ctr"/>
+          <a:lstStyle/>
+          <a:p>
+            <a:pPr algn="ctr"/>
+            <a:endParaRPr lang="es-ES"/>
+          </a:p>
+        </p:txBody>
+      </p:sp>
+      <p:sp>
+        <p:nvSpPr>
+          <p:cNvPr id="61" name="CuadroTexto 60">
+            <a:extLst>
+              <a:ext uri="{FF2B5EF4-FFF2-40B4-BE49-F238E27FC236}">
+                <a16:creationId xmlns:a16="http://schemas.microsoft.com/office/drawing/2014/main" id="{5A5ECD15-316D-C4D5-CA12-A51005B1BFFF}"/>
+              </a:ext>
+            </a:extLst>
+          </p:cNvPr>
+          <p:cNvSpPr txBox="1"/>
+          <p:nvPr/>
+        </p:nvSpPr>
+        <p:spPr>
+          <a:xfrm>
+            <a:off x="1612461" y="2233065"/>
+            <a:ext cx="1039067" cy="338554"/>
+          </a:xfrm>
+          <a:prstGeom prst="rect">
+            <a:avLst/>
+          </a:prstGeom>
+          <a:noFill/>
+        </p:spPr>
+        <p:txBody>
+          <a:bodyPr wrap="none" rtlCol="0">
+            <a:spAutoFit/>
+          </a:bodyPr>
+          <a:lstStyle/>
+          <a:p>
+            <a:r>
+              <a:rPr lang="es-ES" sz="800" dirty="0"/>
+              <a:t>JUEGO MARACUYA</a:t>
+            </a:r>
+          </a:p>
+          <a:p>
+            <a:r>
+              <a:rPr lang="es-ES" sz="800" dirty="0"/>
+              <a:t>x1</a:t>
+            </a:r>
+          </a:p>
+        </p:txBody>
+      </p:sp>
+      <p:sp>
+        <p:nvSpPr>
+          <p:cNvPr id="62" name="Rectángulo 61">
+            <a:extLst>
+              <a:ext uri="{FF2B5EF4-FFF2-40B4-BE49-F238E27FC236}">
+                <a16:creationId xmlns:a16="http://schemas.microsoft.com/office/drawing/2014/main" id="{6B84D2F9-B982-FBD0-287D-C11062640986}"/>
+              </a:ext>
+            </a:extLst>
+          </p:cNvPr>
+          <p:cNvSpPr/>
+          <p:nvPr/>
+        </p:nvSpPr>
+        <p:spPr>
+          <a:xfrm>
+            <a:off x="1433355" y="2269398"/>
+            <a:ext cx="223134" cy="215445"/>
+          </a:xfrm>
+          <a:prstGeom prst="rect">
+            <a:avLst/>
+          </a:prstGeom>
+          <a:solidFill>
+            <a:schemeClr val="bg1">
+              <a:lumMod val="85000"/>
+            </a:schemeClr>
+          </a:solidFill>
+          <a:ln>
+            <a:solidFill>
+              <a:schemeClr val="bg1">
+                <a:lumMod val="65000"/>
+              </a:schemeClr>
+            </a:solidFill>
+          </a:ln>
+        </p:spPr>
+        <p:style>
+          <a:lnRef idx="2">
+            <a:schemeClr val="accent1">
+              <a:shade val="15000"/>
+            </a:schemeClr>
+          </a:lnRef>
+          <a:fillRef idx="1">
+            <a:schemeClr val="accent1"/>
+          </a:fillRef>
+          <a:effectRef idx="0">
+            <a:schemeClr val="accent1"/>
+          </a:effectRef>
+          <a:fontRef idx="minor">
+            <a:schemeClr val="lt1"/>
+          </a:fontRef>
+        </p:style>
+        <p:txBody>
+          <a:bodyPr rtlCol="0" anchor="ctr"/>
+          <a:lstStyle/>
+          <a:p>
+            <a:pPr algn="ctr"/>
+            <a:endParaRPr lang="es-ES"/>
+          </a:p>
+        </p:txBody>
+      </p:sp>
+      <p:sp>
+        <p:nvSpPr>
+          <p:cNvPr id="63" name="CuadroTexto 62">
+            <a:extLst>
+              <a:ext uri="{FF2B5EF4-FFF2-40B4-BE49-F238E27FC236}">
+                <a16:creationId xmlns:a16="http://schemas.microsoft.com/office/drawing/2014/main" id="{606F7801-7568-165F-ACA1-F91609984206}"/>
+              </a:ext>
+            </a:extLst>
+          </p:cNvPr>
+          <p:cNvSpPr txBox="1"/>
+          <p:nvPr/>
+        </p:nvSpPr>
+        <p:spPr>
+          <a:xfrm>
+            <a:off x="1331527" y="2271031"/>
+            <a:ext cx="439544" cy="215444"/>
+          </a:xfrm>
+          <a:prstGeom prst="rect">
+            <a:avLst/>
+          </a:prstGeom>
+          <a:noFill/>
+        </p:spPr>
+        <p:txBody>
+          <a:bodyPr wrap="square" rtlCol="0">
+            <a:spAutoFit/>
+          </a:bodyPr>
+          <a:lstStyle/>
+          <a:p>
+            <a:r>
+              <a:rPr lang="es-ES" sz="800" dirty="0"/>
+              <a:t>FOTO</a:t>
+            </a:r>
+          </a:p>
+        </p:txBody>
+      </p:sp>
+      <p:sp>
+        <p:nvSpPr>
+          <p:cNvPr id="64" name="Rectángulo 63">
+            <a:extLst>
+              <a:ext uri="{FF2B5EF4-FFF2-40B4-BE49-F238E27FC236}">
+                <a16:creationId xmlns:a16="http://schemas.microsoft.com/office/drawing/2014/main" id="{99F8A2A5-6E78-3C6C-C47F-469EDAC5BF08}"/>
+              </a:ext>
+            </a:extLst>
+          </p:cNvPr>
+          <p:cNvSpPr/>
+          <p:nvPr/>
+        </p:nvSpPr>
+        <p:spPr>
+          <a:xfrm>
+            <a:off x="2633685" y="2256962"/>
+            <a:ext cx="242819" cy="210409"/>
+          </a:xfrm>
+          <a:prstGeom prst="rect">
+            <a:avLst/>
+          </a:prstGeom>
+          <a:solidFill>
+            <a:schemeClr val="accent1"/>
+          </a:solidFill>
+          <a:ln>
+            <a:solidFill>
+              <a:schemeClr val="accent1"/>
+            </a:solidFill>
+          </a:ln>
+        </p:spPr>
+        <p:style>
+          <a:lnRef idx="2">
+            <a:schemeClr val="accent1">
+              <a:shade val="15000"/>
+            </a:schemeClr>
+          </a:lnRef>
+          <a:fillRef idx="1">
+            <a:schemeClr val="accent1"/>
+          </a:fillRef>
+          <a:effectRef idx="0">
+            <a:schemeClr val="accent1"/>
+          </a:effectRef>
+          <a:fontRef idx="minor">
+            <a:schemeClr val="lt1"/>
+          </a:fontRef>
+        </p:style>
+        <p:txBody>
+          <a:bodyPr rtlCol="0" anchor="ctr"/>
+          <a:lstStyle/>
+          <a:p>
+            <a:pPr algn="ctr"/>
+            <a:endParaRPr lang="es-ES">
+              <a:solidFill>
+                <a:schemeClr val="accent1"/>
+              </a:solidFill>
+            </a:endParaRPr>
+          </a:p>
+        </p:txBody>
+      </p:sp>
+      <p:sp>
+        <p:nvSpPr>
+          <p:cNvPr id="65" name="Rectángulo 64">
+            <a:extLst>
+              <a:ext uri="{FF2B5EF4-FFF2-40B4-BE49-F238E27FC236}">
+                <a16:creationId xmlns:a16="http://schemas.microsoft.com/office/drawing/2014/main" id="{830DEED3-525F-287B-F6E4-A86219D8DFE1}"/>
+              </a:ext>
+            </a:extLst>
+          </p:cNvPr>
+          <p:cNvSpPr/>
+          <p:nvPr/>
+        </p:nvSpPr>
+        <p:spPr>
+          <a:xfrm>
+            <a:off x="2918359" y="2256962"/>
+            <a:ext cx="170016" cy="210409"/>
+          </a:xfrm>
+          <a:prstGeom prst="rect">
+            <a:avLst/>
+          </a:prstGeom>
+          <a:solidFill>
+            <a:srgbClr val="FF0000"/>
+          </a:solidFill>
+          <a:ln>
+            <a:solidFill>
+              <a:srgbClr val="FF0000"/>
+            </a:solidFill>
+          </a:ln>
+        </p:spPr>
+        <p:style>
+          <a:lnRef idx="2">
+            <a:schemeClr val="accent1">
+              <a:shade val="15000"/>
+            </a:schemeClr>
+          </a:lnRef>
+          <a:fillRef idx="1">
+            <a:schemeClr val="accent1"/>
+          </a:fillRef>
+          <a:effectRef idx="0">
+            <a:schemeClr val="accent1"/>
+          </a:effectRef>
+          <a:fontRef idx="minor">
+            <a:schemeClr val="lt1"/>
+          </a:fontRef>
+        </p:style>
+        <p:txBody>
+          <a:bodyPr rtlCol="0" anchor="ctr"/>
+          <a:lstStyle/>
+          <a:p>
+            <a:pPr algn="ctr"/>
+            <a:endParaRPr lang="es-ES"/>
+          </a:p>
+        </p:txBody>
+      </p:sp>
+      <p:sp>
+        <p:nvSpPr>
+          <p:cNvPr id="66" name="CuadroTexto 65">
+            <a:extLst>
+              <a:ext uri="{FF2B5EF4-FFF2-40B4-BE49-F238E27FC236}">
+                <a16:creationId xmlns:a16="http://schemas.microsoft.com/office/drawing/2014/main" id="{E3BB57BE-2EDB-92BC-575F-8E20095554FD}"/>
+              </a:ext>
+            </a:extLst>
+          </p:cNvPr>
+          <p:cNvSpPr txBox="1"/>
+          <p:nvPr/>
+        </p:nvSpPr>
+        <p:spPr>
+          <a:xfrm>
+            <a:off x="1492969" y="2651588"/>
+            <a:ext cx="1425390" cy="215444"/>
+          </a:xfrm>
+          <a:prstGeom prst="rect">
+            <a:avLst/>
+          </a:prstGeom>
+          <a:noFill/>
+        </p:spPr>
+        <p:txBody>
+          <a:bodyPr wrap="none" rtlCol="0">
+            <a:spAutoFit/>
+          </a:bodyPr>
+          <a:lstStyle/>
+          <a:p>
+            <a:r>
+              <a:rPr lang="es-ES" sz="800" dirty="0"/>
+              <a:t>COMENTARIO DEL CLIENTE</a:t>
+            </a:r>
+          </a:p>
+        </p:txBody>
+      </p:sp>
+      <p:sp>
+        <p:nvSpPr>
+          <p:cNvPr id="67" name="Rectángulo 66">
+            <a:extLst>
+              <a:ext uri="{FF2B5EF4-FFF2-40B4-BE49-F238E27FC236}">
+                <a16:creationId xmlns:a16="http://schemas.microsoft.com/office/drawing/2014/main" id="{FB82B709-726A-01AF-2574-726673885A55}"/>
+              </a:ext>
+            </a:extLst>
+          </p:cNvPr>
+          <p:cNvSpPr/>
+          <p:nvPr/>
+        </p:nvSpPr>
+        <p:spPr>
+          <a:xfrm>
+            <a:off x="4997378" y="1288472"/>
+            <a:ext cx="1725029" cy="2010705"/>
+          </a:xfrm>
+          <a:prstGeom prst="rect">
+            <a:avLst/>
+          </a:prstGeom>
+          <a:solidFill>
+            <a:schemeClr val="bg1"/>
+          </a:solidFill>
+          <a:ln w="9525">
+            <a:solidFill>
+              <a:schemeClr val="bg1">
+                <a:lumMod val="65000"/>
+              </a:schemeClr>
+            </a:solidFill>
+          </a:ln>
+        </p:spPr>
+        <p:style>
+          <a:lnRef idx="2">
+            <a:schemeClr val="accent1">
+              <a:shade val="15000"/>
+            </a:schemeClr>
+          </a:lnRef>
+          <a:fillRef idx="1">
+            <a:schemeClr val="accent1"/>
+          </a:fillRef>
+          <a:effectRef idx="0">
+            <a:schemeClr val="accent1"/>
+          </a:effectRef>
+          <a:fontRef idx="minor">
+            <a:schemeClr val="lt1"/>
+          </a:fontRef>
+        </p:style>
+        <p:txBody>
+          <a:bodyPr rtlCol="0" anchor="ctr"/>
+          <a:lstStyle/>
+          <a:p>
+            <a:pPr algn="ctr"/>
+            <a:endParaRPr lang="es-ES"/>
+          </a:p>
+        </p:txBody>
+      </p:sp>
+      <p:sp>
+        <p:nvSpPr>
+          <p:cNvPr id="68" name="Rectángulo 67">
+            <a:extLst>
+              <a:ext uri="{FF2B5EF4-FFF2-40B4-BE49-F238E27FC236}">
+                <a16:creationId xmlns:a16="http://schemas.microsoft.com/office/drawing/2014/main" id="{B68E3006-0D3E-56C9-3335-6D72781DDD3E}"/>
+              </a:ext>
+            </a:extLst>
+          </p:cNvPr>
+          <p:cNvSpPr/>
+          <p:nvPr/>
+        </p:nvSpPr>
+        <p:spPr>
+          <a:xfrm>
+            <a:off x="6787991" y="1288472"/>
+            <a:ext cx="1725029" cy="2010705"/>
+          </a:xfrm>
+          <a:prstGeom prst="rect">
+            <a:avLst/>
+          </a:prstGeom>
+          <a:solidFill>
+            <a:schemeClr val="bg1"/>
+          </a:solidFill>
+          <a:ln w="9525">
+            <a:solidFill>
+              <a:schemeClr val="bg1">
+                <a:lumMod val="65000"/>
+              </a:schemeClr>
+            </a:solidFill>
+          </a:ln>
+        </p:spPr>
+        <p:style>
+          <a:lnRef idx="2">
+            <a:schemeClr val="accent1">
+              <a:shade val="15000"/>
+            </a:schemeClr>
+          </a:lnRef>
+          <a:fillRef idx="1">
+            <a:schemeClr val="accent1"/>
+          </a:fillRef>
+          <a:effectRef idx="0">
+            <a:schemeClr val="accent1"/>
+          </a:effectRef>
+          <a:fontRef idx="minor">
+            <a:schemeClr val="lt1"/>
+          </a:fontRef>
+        </p:style>
+        <p:txBody>
+          <a:bodyPr rtlCol="0" anchor="ctr"/>
+          <a:lstStyle/>
+          <a:p>
+            <a:pPr algn="ctr"/>
+            <a:endParaRPr lang="es-ES"/>
+          </a:p>
+        </p:txBody>
+      </p:sp>
+      <p:sp>
+        <p:nvSpPr>
+          <p:cNvPr id="101" name="CuadroTexto 100">
+            <a:extLst>
+              <a:ext uri="{FF2B5EF4-FFF2-40B4-BE49-F238E27FC236}">
+                <a16:creationId xmlns:a16="http://schemas.microsoft.com/office/drawing/2014/main" id="{CCD912B9-3D2E-A631-8D70-4C1155AD5E5A}"/>
+              </a:ext>
+            </a:extLst>
+          </p:cNvPr>
+          <p:cNvSpPr txBox="1"/>
+          <p:nvPr/>
+        </p:nvSpPr>
+        <p:spPr>
+          <a:xfrm>
+            <a:off x="1346410" y="143458"/>
+            <a:ext cx="1523174" cy="253916"/>
+          </a:xfrm>
+          <a:prstGeom prst="rect">
+            <a:avLst/>
+          </a:prstGeom>
+          <a:noFill/>
+        </p:spPr>
+        <p:txBody>
+          <a:bodyPr wrap="none" rtlCol="0">
+            <a:spAutoFit/>
+          </a:bodyPr>
+          <a:lstStyle/>
+          <a:p>
+            <a:pPr algn="r"/>
+            <a:r>
+              <a:rPr lang="es-ES" sz="1050" b="1" dirty="0"/>
+              <a:t>DASHBOARD COCINA</a:t>
+            </a:r>
+          </a:p>
+        </p:txBody>
+      </p:sp>
+      <p:sp>
+        <p:nvSpPr>
+          <p:cNvPr id="104" name="Rectángulo 103">
+            <a:extLst>
+              <a:ext uri="{FF2B5EF4-FFF2-40B4-BE49-F238E27FC236}">
+                <a16:creationId xmlns:a16="http://schemas.microsoft.com/office/drawing/2014/main" id="{C4845120-5059-029F-D829-EAF47FA47FC9}"/>
+              </a:ext>
+            </a:extLst>
+          </p:cNvPr>
+          <p:cNvSpPr/>
+          <p:nvPr/>
+        </p:nvSpPr>
+        <p:spPr>
+          <a:xfrm>
+            <a:off x="1425850" y="3906581"/>
+            <a:ext cx="1725029" cy="2010705"/>
+          </a:xfrm>
+          <a:prstGeom prst="rect">
+            <a:avLst/>
+          </a:prstGeom>
+          <a:solidFill>
+            <a:schemeClr val="bg1"/>
+          </a:solidFill>
+          <a:ln w="9525">
+            <a:solidFill>
+              <a:schemeClr val="bg1">
+                <a:lumMod val="65000"/>
+              </a:schemeClr>
+            </a:solidFill>
+          </a:ln>
+        </p:spPr>
+        <p:style>
+          <a:lnRef idx="2">
+            <a:schemeClr val="accent1">
+              <a:shade val="15000"/>
+            </a:schemeClr>
+          </a:lnRef>
+          <a:fillRef idx="1">
+            <a:schemeClr val="accent1"/>
+          </a:fillRef>
+          <a:effectRef idx="0">
+            <a:schemeClr val="accent1"/>
+          </a:effectRef>
+          <a:fontRef idx="minor">
+            <a:schemeClr val="lt1"/>
+          </a:fontRef>
+        </p:style>
+        <p:txBody>
+          <a:bodyPr rtlCol="0" anchor="ctr"/>
+          <a:lstStyle/>
+          <a:p>
+            <a:pPr algn="ctr"/>
+            <a:endParaRPr lang="es-ES"/>
+          </a:p>
+        </p:txBody>
+      </p:sp>
+      <p:sp>
+        <p:nvSpPr>
+          <p:cNvPr id="112" name="CuadroTexto 111">
+            <a:extLst>
+              <a:ext uri="{FF2B5EF4-FFF2-40B4-BE49-F238E27FC236}">
+                <a16:creationId xmlns:a16="http://schemas.microsoft.com/office/drawing/2014/main" id="{E1715843-9FC7-00AC-CB38-70F739AE59DD}"/>
+              </a:ext>
+            </a:extLst>
+          </p:cNvPr>
+          <p:cNvSpPr txBox="1"/>
+          <p:nvPr/>
+        </p:nvSpPr>
+        <p:spPr>
+          <a:xfrm>
+            <a:off x="1934686" y="3946231"/>
+            <a:ext cx="652743" cy="215444"/>
+          </a:xfrm>
+          <a:prstGeom prst="rect">
+            <a:avLst/>
+          </a:prstGeom>
+          <a:noFill/>
+        </p:spPr>
+        <p:txBody>
+          <a:bodyPr wrap="none" rtlCol="0">
+            <a:spAutoFit/>
+          </a:bodyPr>
+          <a:lstStyle/>
+          <a:p>
+            <a:r>
+              <a:rPr lang="es-ES" sz="800" dirty="0"/>
+              <a:t>ORDEN #1</a:t>
+            </a:r>
+          </a:p>
+        </p:txBody>
+      </p:sp>
+      <p:sp>
+        <p:nvSpPr>
+          <p:cNvPr id="117" name="CuadroTexto 116">
+            <a:extLst>
+              <a:ext uri="{FF2B5EF4-FFF2-40B4-BE49-F238E27FC236}">
+                <a16:creationId xmlns:a16="http://schemas.microsoft.com/office/drawing/2014/main" id="{B4761C77-EC89-7A3D-7681-41C783206056}"/>
+              </a:ext>
+            </a:extLst>
+          </p:cNvPr>
+          <p:cNvSpPr txBox="1"/>
+          <p:nvPr/>
+        </p:nvSpPr>
+        <p:spPr>
+          <a:xfrm>
+            <a:off x="1446228" y="4005783"/>
+            <a:ext cx="527709" cy="215444"/>
+          </a:xfrm>
+          <a:prstGeom prst="rect">
+            <a:avLst/>
+          </a:prstGeom>
+          <a:noFill/>
+        </p:spPr>
+        <p:txBody>
+          <a:bodyPr wrap="none" rtlCol="0">
+            <a:spAutoFit/>
+          </a:bodyPr>
+          <a:lstStyle/>
+          <a:p>
+            <a:r>
+              <a:rPr lang="es-ES" sz="800" b="1" dirty="0"/>
+              <a:t>9:30AM</a:t>
+            </a:r>
+          </a:p>
+        </p:txBody>
+      </p:sp>
+      <p:sp>
+        <p:nvSpPr>
+          <p:cNvPr id="118" name="CuadroTexto 117">
+            <a:extLst>
+              <a:ext uri="{FF2B5EF4-FFF2-40B4-BE49-F238E27FC236}">
+                <a16:creationId xmlns:a16="http://schemas.microsoft.com/office/drawing/2014/main" id="{8503DB3A-9764-3499-DE5B-85D72B759BFD}"/>
+              </a:ext>
+            </a:extLst>
+          </p:cNvPr>
+          <p:cNvSpPr txBox="1"/>
+          <p:nvPr/>
+        </p:nvSpPr>
+        <p:spPr>
+          <a:xfrm>
+            <a:off x="2588179" y="4005783"/>
+            <a:ext cx="463588" cy="215444"/>
+          </a:xfrm>
+          <a:prstGeom prst="rect">
+            <a:avLst/>
+          </a:prstGeom>
+          <a:noFill/>
+        </p:spPr>
+        <p:txBody>
+          <a:bodyPr wrap="none" rtlCol="0">
+            <a:spAutoFit/>
+          </a:bodyPr>
+          <a:lstStyle/>
+          <a:p>
+            <a:r>
+              <a:rPr lang="es-ES" sz="800" b="1" dirty="0"/>
+              <a:t>1:45M</a:t>
+            </a:r>
+          </a:p>
+        </p:txBody>
+      </p:sp>
+      <p:cxnSp>
+        <p:nvCxnSpPr>
+          <p:cNvPr id="119" name="Conector recto de flecha 118">
+            <a:extLst>
+              <a:ext uri="{FF2B5EF4-FFF2-40B4-BE49-F238E27FC236}">
+                <a16:creationId xmlns:a16="http://schemas.microsoft.com/office/drawing/2014/main" id="{46733007-4A4C-DE49-00D7-2644AEB88605}"/>
+              </a:ext>
+            </a:extLst>
+          </p:cNvPr>
+          <p:cNvCxnSpPr/>
+          <p:nvPr/>
+        </p:nvCxnSpPr>
+        <p:spPr>
+          <a:xfrm>
+            <a:off x="1550221" y="4005783"/>
+            <a:ext cx="255777" cy="0"/>
+          </a:xfrm>
+          <a:prstGeom prst="straightConnector1">
+            <a:avLst/>
+          </a:prstGeom>
+          <a:ln>
+            <a:tailEnd type="triangle"/>
+          </a:ln>
+        </p:spPr>
+        <p:style>
+          <a:lnRef idx="2">
+            <a:schemeClr val="accent1"/>
+          </a:lnRef>
+          <a:fillRef idx="0">
+            <a:schemeClr val="accent1"/>
+          </a:fillRef>
+          <a:effectRef idx="1">
+            <a:schemeClr val="accent1"/>
+          </a:effectRef>
+          <a:fontRef idx="minor">
+            <a:schemeClr val="tx1"/>
+          </a:fontRef>
+        </p:style>
+      </p:cxnSp>
+      <p:cxnSp>
+        <p:nvCxnSpPr>
+          <p:cNvPr id="121" name="Conector recto de flecha 120">
+            <a:extLst>
+              <a:ext uri="{FF2B5EF4-FFF2-40B4-BE49-F238E27FC236}">
+                <a16:creationId xmlns:a16="http://schemas.microsoft.com/office/drawing/2014/main" id="{431C7307-6E17-4C8F-823C-24A477904C49}"/>
+              </a:ext>
+            </a:extLst>
+          </p:cNvPr>
+          <p:cNvCxnSpPr/>
+          <p:nvPr/>
+        </p:nvCxnSpPr>
+        <p:spPr>
+          <a:xfrm>
+            <a:off x="2699767" y="4005783"/>
+            <a:ext cx="255777" cy="0"/>
+          </a:xfrm>
+          <a:prstGeom prst="straightConnector1">
+            <a:avLst/>
+          </a:prstGeom>
+          <a:ln>
+            <a:tailEnd type="triangle"/>
+          </a:ln>
+        </p:spPr>
+        <p:style>
+          <a:lnRef idx="2">
+            <a:schemeClr val="accent1"/>
+          </a:lnRef>
+          <a:fillRef idx="0">
+            <a:schemeClr val="accent1"/>
+          </a:fillRef>
+          <a:effectRef idx="1">
+            <a:schemeClr val="accent1"/>
+          </a:effectRef>
+          <a:fontRef idx="minor">
+            <a:schemeClr val="tx1"/>
+          </a:fontRef>
+        </p:style>
+      </p:cxnSp>
+      <p:cxnSp>
+        <p:nvCxnSpPr>
+          <p:cNvPr id="122" name="Conector recto 121">
+            <a:extLst>
+              <a:ext uri="{FF2B5EF4-FFF2-40B4-BE49-F238E27FC236}">
+                <a16:creationId xmlns:a16="http://schemas.microsoft.com/office/drawing/2014/main" id="{735E7FA7-5F31-5C7E-955F-A42B11084608}"/>
+              </a:ext>
+            </a:extLst>
+          </p:cNvPr>
+          <p:cNvCxnSpPr>
+            <a:cxnSpLocks/>
+          </p:cNvCxnSpPr>
+          <p:nvPr/>
+        </p:nvCxnSpPr>
+        <p:spPr>
+          <a:xfrm>
+            <a:off x="1480074" y="4221227"/>
+            <a:ext cx="1571693" cy="0"/>
+          </a:xfrm>
+          <a:prstGeom prst="line">
+            <a:avLst/>
+          </a:prstGeom>
+          <a:ln w="6350"/>
+        </p:spPr>
+        <p:style>
+          <a:lnRef idx="2">
+            <a:schemeClr val="accent1"/>
+          </a:lnRef>
+          <a:fillRef idx="0">
+            <a:schemeClr val="accent1"/>
+          </a:fillRef>
+          <a:effectRef idx="1">
+            <a:schemeClr val="accent1"/>
+          </a:effectRef>
+          <a:fontRef idx="minor">
+            <a:schemeClr val="tx1"/>
+          </a:fontRef>
+        </p:style>
+      </p:cxnSp>
+      <p:sp>
+        <p:nvSpPr>
+          <p:cNvPr id="130" name="CuadroTexto 129">
+            <a:extLst>
+              <a:ext uri="{FF2B5EF4-FFF2-40B4-BE49-F238E27FC236}">
+                <a16:creationId xmlns:a16="http://schemas.microsoft.com/office/drawing/2014/main" id="{E2B8BCD8-D3F9-A138-5D60-00CC30BF3E4F}"/>
+              </a:ext>
+            </a:extLst>
+          </p:cNvPr>
+          <p:cNvSpPr txBox="1"/>
+          <p:nvPr/>
+        </p:nvSpPr>
+        <p:spPr>
+          <a:xfrm>
+            <a:off x="1636008" y="4251806"/>
+            <a:ext cx="939681" cy="338554"/>
+          </a:xfrm>
+          <a:prstGeom prst="rect">
+            <a:avLst/>
+          </a:prstGeom>
+          <a:noFill/>
+        </p:spPr>
+        <p:txBody>
+          <a:bodyPr wrap="none" rtlCol="0">
+            <a:spAutoFit/>
+          </a:bodyPr>
+          <a:lstStyle/>
+          <a:p>
+            <a:r>
+              <a:rPr lang="es-ES" sz="800" dirty="0"/>
+              <a:t>CAUSA RELLENA</a:t>
+            </a:r>
+          </a:p>
+          <a:p>
+            <a:r>
+              <a:rPr lang="es-ES" sz="800" dirty="0"/>
+              <a:t>X 1</a:t>
+            </a:r>
+          </a:p>
+        </p:txBody>
+      </p:sp>
+      <p:sp>
+        <p:nvSpPr>
+          <p:cNvPr id="131" name="Rectángulo 130">
+            <a:extLst>
+              <a:ext uri="{FF2B5EF4-FFF2-40B4-BE49-F238E27FC236}">
+                <a16:creationId xmlns:a16="http://schemas.microsoft.com/office/drawing/2014/main" id="{3291B802-98C2-D446-AF79-6F9DA005823E}"/>
+              </a:ext>
+            </a:extLst>
+          </p:cNvPr>
+          <p:cNvSpPr/>
+          <p:nvPr/>
+        </p:nvSpPr>
+        <p:spPr>
+          <a:xfrm>
+            <a:off x="1456902" y="4296682"/>
+            <a:ext cx="223134" cy="215445"/>
+          </a:xfrm>
+          <a:prstGeom prst="rect">
+            <a:avLst/>
+          </a:prstGeom>
+          <a:solidFill>
+            <a:schemeClr val="bg1">
+              <a:lumMod val="85000"/>
+            </a:schemeClr>
+          </a:solidFill>
+          <a:ln>
+            <a:solidFill>
+              <a:schemeClr val="bg1">
+                <a:lumMod val="65000"/>
+              </a:schemeClr>
+            </a:solidFill>
+          </a:ln>
+        </p:spPr>
+        <p:style>
+          <a:lnRef idx="2">
+            <a:schemeClr val="accent1">
+              <a:shade val="15000"/>
+            </a:schemeClr>
+          </a:lnRef>
+          <a:fillRef idx="1">
+            <a:schemeClr val="accent1"/>
+          </a:fillRef>
+          <a:effectRef idx="0">
+            <a:schemeClr val="accent1"/>
+          </a:effectRef>
+          <a:fontRef idx="minor">
+            <a:schemeClr val="lt1"/>
+          </a:fontRef>
+        </p:style>
+        <p:txBody>
+          <a:bodyPr rtlCol="0" anchor="ctr"/>
+          <a:lstStyle/>
+          <a:p>
+            <a:pPr algn="ctr"/>
+            <a:endParaRPr lang="es-ES"/>
+          </a:p>
+        </p:txBody>
+      </p:sp>
+      <p:sp>
+        <p:nvSpPr>
+          <p:cNvPr id="132" name="CuadroTexto 131">
+            <a:extLst>
+              <a:ext uri="{FF2B5EF4-FFF2-40B4-BE49-F238E27FC236}">
+                <a16:creationId xmlns:a16="http://schemas.microsoft.com/office/drawing/2014/main" id="{2814CD0B-48F2-43B9-D975-81089E89054C}"/>
+              </a:ext>
+            </a:extLst>
+          </p:cNvPr>
+          <p:cNvSpPr txBox="1"/>
+          <p:nvPr/>
+        </p:nvSpPr>
+        <p:spPr>
+          <a:xfrm>
+            <a:off x="1633111" y="4564424"/>
+            <a:ext cx="909223" cy="338554"/>
+          </a:xfrm>
+          <a:prstGeom prst="rect">
+            <a:avLst/>
+          </a:prstGeom>
+          <a:noFill/>
+        </p:spPr>
+        <p:txBody>
+          <a:bodyPr wrap="none" rtlCol="0">
+            <a:spAutoFit/>
+          </a:bodyPr>
+          <a:lstStyle/>
+          <a:p>
+            <a:r>
+              <a:rPr lang="es-ES" sz="800" dirty="0"/>
+              <a:t>ARROZ CHAUFA</a:t>
+            </a:r>
+          </a:p>
+          <a:p>
+            <a:r>
+              <a:rPr lang="es-ES" sz="800" dirty="0"/>
+              <a:t>X 1</a:t>
+            </a:r>
+          </a:p>
+        </p:txBody>
+      </p:sp>
+      <p:sp>
+        <p:nvSpPr>
+          <p:cNvPr id="133" name="Rectángulo 132">
+            <a:extLst>
+              <a:ext uri="{FF2B5EF4-FFF2-40B4-BE49-F238E27FC236}">
+                <a16:creationId xmlns:a16="http://schemas.microsoft.com/office/drawing/2014/main" id="{32F984B1-26C4-BBEB-8DC8-20C8DBB4CD77}"/>
+              </a:ext>
+            </a:extLst>
+          </p:cNvPr>
+          <p:cNvSpPr/>
+          <p:nvPr/>
+        </p:nvSpPr>
+        <p:spPr>
+          <a:xfrm>
+            <a:off x="1454005" y="4594369"/>
+            <a:ext cx="223134" cy="215445"/>
+          </a:xfrm>
+          <a:prstGeom prst="rect">
+            <a:avLst/>
+          </a:prstGeom>
+          <a:solidFill>
+            <a:schemeClr val="bg1">
+              <a:lumMod val="85000"/>
+            </a:schemeClr>
+          </a:solidFill>
+          <a:ln>
+            <a:solidFill>
+              <a:schemeClr val="bg1">
+                <a:lumMod val="65000"/>
+              </a:schemeClr>
+            </a:solidFill>
+          </a:ln>
+        </p:spPr>
+        <p:style>
+          <a:lnRef idx="2">
+            <a:schemeClr val="accent1">
+              <a:shade val="15000"/>
+            </a:schemeClr>
+          </a:lnRef>
+          <a:fillRef idx="1">
+            <a:schemeClr val="accent1"/>
+          </a:fillRef>
+          <a:effectRef idx="0">
+            <a:schemeClr val="accent1"/>
+          </a:effectRef>
+          <a:fontRef idx="minor">
+            <a:schemeClr val="lt1"/>
+          </a:fontRef>
+        </p:style>
+        <p:txBody>
+          <a:bodyPr rtlCol="0" anchor="ctr"/>
+          <a:lstStyle/>
+          <a:p>
+            <a:pPr algn="ctr"/>
+            <a:endParaRPr lang="es-ES"/>
+          </a:p>
+        </p:txBody>
+      </p:sp>
+      <p:sp>
+        <p:nvSpPr>
+          <p:cNvPr id="134" name="CuadroTexto 133">
+            <a:extLst>
+              <a:ext uri="{FF2B5EF4-FFF2-40B4-BE49-F238E27FC236}">
+                <a16:creationId xmlns:a16="http://schemas.microsoft.com/office/drawing/2014/main" id="{4CC8BC24-A85C-753B-9DFC-7E413CB807F4}"/>
+              </a:ext>
+            </a:extLst>
+          </p:cNvPr>
+          <p:cNvSpPr txBox="1"/>
+          <p:nvPr/>
+        </p:nvSpPr>
+        <p:spPr>
+          <a:xfrm>
+            <a:off x="1352177" y="4596002"/>
+            <a:ext cx="439544" cy="215444"/>
+          </a:xfrm>
+          <a:prstGeom prst="rect">
+            <a:avLst/>
+          </a:prstGeom>
+          <a:noFill/>
+        </p:spPr>
+        <p:txBody>
+          <a:bodyPr wrap="square" rtlCol="0">
+            <a:spAutoFit/>
+          </a:bodyPr>
+          <a:lstStyle/>
+          <a:p>
+            <a:r>
+              <a:rPr lang="es-ES" sz="800" dirty="0"/>
+              <a:t>FOTO</a:t>
+            </a:r>
+          </a:p>
+        </p:txBody>
+      </p:sp>
+      <p:sp>
+        <p:nvSpPr>
+          <p:cNvPr id="135" name="Rectángulo 134">
+            <a:extLst>
+              <a:ext uri="{FF2B5EF4-FFF2-40B4-BE49-F238E27FC236}">
+                <a16:creationId xmlns:a16="http://schemas.microsoft.com/office/drawing/2014/main" id="{99BBC037-20B7-2E44-7BE2-34DD3FB122A9}"/>
+              </a:ext>
+            </a:extLst>
+          </p:cNvPr>
+          <p:cNvSpPr/>
+          <p:nvPr/>
+        </p:nvSpPr>
+        <p:spPr>
+          <a:xfrm>
+            <a:off x="2655788" y="4283652"/>
+            <a:ext cx="242819" cy="210409"/>
+          </a:xfrm>
+          <a:prstGeom prst="rect">
+            <a:avLst/>
+          </a:prstGeom>
+          <a:solidFill>
+            <a:schemeClr val="bg1">
+              <a:lumMod val="85000"/>
+            </a:schemeClr>
+          </a:solidFill>
+          <a:ln>
+            <a:solidFill>
+              <a:schemeClr val="accent1"/>
+            </a:solidFill>
+          </a:ln>
+        </p:spPr>
+        <p:style>
+          <a:lnRef idx="2">
+            <a:schemeClr val="accent1">
+              <a:shade val="15000"/>
+            </a:schemeClr>
+          </a:lnRef>
+          <a:fillRef idx="1">
+            <a:schemeClr val="accent1"/>
+          </a:fillRef>
+          <a:effectRef idx="0">
+            <a:schemeClr val="accent1"/>
+          </a:effectRef>
+          <a:fontRef idx="minor">
+            <a:schemeClr val="lt1"/>
+          </a:fontRef>
+        </p:style>
+        <p:txBody>
+          <a:bodyPr rtlCol="0" anchor="ctr"/>
+          <a:lstStyle/>
+          <a:p>
+            <a:pPr algn="ctr"/>
+            <a:endParaRPr lang="es-ES"/>
+          </a:p>
+        </p:txBody>
+      </p:sp>
+      <p:sp>
+        <p:nvSpPr>
+          <p:cNvPr id="136" name="Rectángulo 135">
+            <a:extLst>
+              <a:ext uri="{FF2B5EF4-FFF2-40B4-BE49-F238E27FC236}">
+                <a16:creationId xmlns:a16="http://schemas.microsoft.com/office/drawing/2014/main" id="{3AA02B6B-318F-8A9C-1586-26A5A0291733}"/>
+              </a:ext>
+            </a:extLst>
+          </p:cNvPr>
+          <p:cNvSpPr/>
+          <p:nvPr/>
+        </p:nvSpPr>
+        <p:spPr>
+          <a:xfrm>
+            <a:off x="2940462" y="4283652"/>
+            <a:ext cx="170016" cy="210409"/>
+          </a:xfrm>
+          <a:prstGeom prst="rect">
+            <a:avLst/>
+          </a:prstGeom>
+          <a:solidFill>
+            <a:srgbClr val="FF0000"/>
+          </a:solidFill>
+          <a:ln>
+            <a:solidFill>
+              <a:srgbClr val="FF0000"/>
+            </a:solidFill>
+          </a:ln>
+        </p:spPr>
+        <p:style>
+          <a:lnRef idx="2">
+            <a:schemeClr val="accent1">
+              <a:shade val="15000"/>
+            </a:schemeClr>
+          </a:lnRef>
+          <a:fillRef idx="1">
+            <a:schemeClr val="accent1"/>
+          </a:fillRef>
+          <a:effectRef idx="0">
+            <a:schemeClr val="accent1"/>
+          </a:effectRef>
+          <a:fontRef idx="minor">
+            <a:schemeClr val="lt1"/>
+          </a:fontRef>
+        </p:style>
+        <p:txBody>
+          <a:bodyPr rtlCol="0" anchor="ctr"/>
+          <a:lstStyle/>
+          <a:p>
+            <a:pPr algn="ctr"/>
+            <a:endParaRPr lang="es-ES"/>
+          </a:p>
+        </p:txBody>
+      </p:sp>
+      <p:sp>
+        <p:nvSpPr>
+          <p:cNvPr id="142" name="Rectángulo 141">
+            <a:extLst>
+              <a:ext uri="{FF2B5EF4-FFF2-40B4-BE49-F238E27FC236}">
+                <a16:creationId xmlns:a16="http://schemas.microsoft.com/office/drawing/2014/main" id="{95BCFE8E-9D2F-1D0E-5BA4-2E81BB18AD0C}"/>
+              </a:ext>
+            </a:extLst>
+          </p:cNvPr>
+          <p:cNvSpPr/>
+          <p:nvPr/>
+        </p:nvSpPr>
+        <p:spPr>
+          <a:xfrm>
+            <a:off x="2654335" y="4582525"/>
+            <a:ext cx="242819" cy="210409"/>
+          </a:xfrm>
+          <a:prstGeom prst="rect">
+            <a:avLst/>
+          </a:prstGeom>
+          <a:solidFill>
+            <a:schemeClr val="bg1">
+              <a:lumMod val="85000"/>
+            </a:schemeClr>
+          </a:solidFill>
+          <a:ln>
+            <a:solidFill>
+              <a:schemeClr val="accent1"/>
+            </a:solidFill>
+          </a:ln>
+        </p:spPr>
+        <p:style>
+          <a:lnRef idx="2">
+            <a:schemeClr val="accent1">
+              <a:shade val="15000"/>
+            </a:schemeClr>
+          </a:lnRef>
+          <a:fillRef idx="1">
+            <a:schemeClr val="accent1"/>
+          </a:fillRef>
+          <a:effectRef idx="0">
+            <a:schemeClr val="accent1"/>
+          </a:effectRef>
+          <a:fontRef idx="minor">
+            <a:schemeClr val="lt1"/>
+          </a:fontRef>
+        </p:style>
+        <p:txBody>
+          <a:bodyPr rtlCol="0" anchor="ctr"/>
+          <a:lstStyle/>
+          <a:p>
+            <a:pPr algn="ctr"/>
+            <a:endParaRPr lang="es-ES"/>
+          </a:p>
+        </p:txBody>
+      </p:sp>
+      <p:sp>
+        <p:nvSpPr>
+          <p:cNvPr id="143" name="Rectángulo 142">
+            <a:extLst>
+              <a:ext uri="{FF2B5EF4-FFF2-40B4-BE49-F238E27FC236}">
+                <a16:creationId xmlns:a16="http://schemas.microsoft.com/office/drawing/2014/main" id="{AB3F06C8-2B9E-A272-3A2A-4198595F68CD}"/>
+              </a:ext>
+            </a:extLst>
+          </p:cNvPr>
+          <p:cNvSpPr/>
+          <p:nvPr/>
+        </p:nvSpPr>
+        <p:spPr>
+          <a:xfrm>
+            <a:off x="2939009" y="4582525"/>
+            <a:ext cx="170016" cy="210409"/>
+          </a:xfrm>
+          <a:prstGeom prst="rect">
+            <a:avLst/>
+          </a:prstGeom>
+          <a:solidFill>
+            <a:srgbClr val="FF0000"/>
+          </a:solidFill>
+          <a:ln>
+            <a:solidFill>
+              <a:srgbClr val="FF0000"/>
+            </a:solidFill>
+          </a:ln>
+        </p:spPr>
+        <p:style>
+          <a:lnRef idx="2">
+            <a:schemeClr val="accent1">
+              <a:shade val="15000"/>
+            </a:schemeClr>
+          </a:lnRef>
+          <a:fillRef idx="1">
+            <a:schemeClr val="accent1"/>
+          </a:fillRef>
+          <a:effectRef idx="0">
+            <a:schemeClr val="accent1"/>
+          </a:effectRef>
+          <a:fontRef idx="minor">
+            <a:schemeClr val="lt1"/>
+          </a:fontRef>
+        </p:style>
+        <p:txBody>
+          <a:bodyPr rtlCol="0" anchor="ctr"/>
+          <a:lstStyle/>
+          <a:p>
+            <a:pPr algn="ctr"/>
+            <a:endParaRPr lang="es-ES"/>
+          </a:p>
+        </p:txBody>
+      </p:sp>
+      <p:sp>
+        <p:nvSpPr>
+          <p:cNvPr id="144" name="CuadroTexto 143">
+            <a:extLst>
+              <a:ext uri="{FF2B5EF4-FFF2-40B4-BE49-F238E27FC236}">
+                <a16:creationId xmlns:a16="http://schemas.microsoft.com/office/drawing/2014/main" id="{155190C7-0B33-7971-A576-B61F73B75E36}"/>
+              </a:ext>
+            </a:extLst>
+          </p:cNvPr>
+          <p:cNvSpPr txBox="1"/>
+          <p:nvPr/>
+        </p:nvSpPr>
+        <p:spPr>
+          <a:xfrm>
+            <a:off x="1633111" y="4851174"/>
+            <a:ext cx="1039067" cy="338554"/>
+          </a:xfrm>
+          <a:prstGeom prst="rect">
+            <a:avLst/>
+          </a:prstGeom>
+          <a:noFill/>
+        </p:spPr>
+        <p:txBody>
+          <a:bodyPr wrap="none" rtlCol="0">
+            <a:spAutoFit/>
+          </a:bodyPr>
+          <a:lstStyle/>
+          <a:p>
+            <a:r>
+              <a:rPr lang="es-ES" sz="800" dirty="0"/>
+              <a:t>JUEGO MARACUYA</a:t>
+            </a:r>
+          </a:p>
+          <a:p>
+            <a:r>
+              <a:rPr lang="es-ES" sz="800" dirty="0"/>
+              <a:t>x1</a:t>
+            </a:r>
+          </a:p>
+        </p:txBody>
+      </p:sp>
+      <p:sp>
+        <p:nvSpPr>
+          <p:cNvPr id="145" name="Rectángulo 144">
+            <a:extLst>
+              <a:ext uri="{FF2B5EF4-FFF2-40B4-BE49-F238E27FC236}">
+                <a16:creationId xmlns:a16="http://schemas.microsoft.com/office/drawing/2014/main" id="{61AA1FED-77AB-758B-5EAA-EE809D8FF635}"/>
+              </a:ext>
+            </a:extLst>
+          </p:cNvPr>
+          <p:cNvSpPr/>
+          <p:nvPr/>
+        </p:nvSpPr>
+        <p:spPr>
+          <a:xfrm>
+            <a:off x="1454005" y="4887507"/>
+            <a:ext cx="223134" cy="215445"/>
+          </a:xfrm>
+          <a:prstGeom prst="rect">
+            <a:avLst/>
+          </a:prstGeom>
+          <a:solidFill>
+            <a:schemeClr val="bg1">
+              <a:lumMod val="85000"/>
+            </a:schemeClr>
+          </a:solidFill>
+          <a:ln>
+            <a:solidFill>
+              <a:schemeClr val="bg1">
+                <a:lumMod val="65000"/>
+              </a:schemeClr>
+            </a:solidFill>
+          </a:ln>
+        </p:spPr>
+        <p:style>
+          <a:lnRef idx="2">
+            <a:schemeClr val="accent1">
+              <a:shade val="15000"/>
+            </a:schemeClr>
+          </a:lnRef>
+          <a:fillRef idx="1">
+            <a:schemeClr val="accent1"/>
+          </a:fillRef>
+          <a:effectRef idx="0">
+            <a:schemeClr val="accent1"/>
+          </a:effectRef>
+          <a:fontRef idx="minor">
+            <a:schemeClr val="lt1"/>
+          </a:fontRef>
+        </p:style>
+        <p:txBody>
+          <a:bodyPr rtlCol="0" anchor="ctr"/>
+          <a:lstStyle/>
+          <a:p>
+            <a:pPr algn="ctr"/>
+            <a:endParaRPr lang="es-ES"/>
+          </a:p>
+        </p:txBody>
+      </p:sp>
+      <p:sp>
+        <p:nvSpPr>
+          <p:cNvPr id="146" name="CuadroTexto 145">
+            <a:extLst>
+              <a:ext uri="{FF2B5EF4-FFF2-40B4-BE49-F238E27FC236}">
+                <a16:creationId xmlns:a16="http://schemas.microsoft.com/office/drawing/2014/main" id="{8855EA36-2778-B336-8DB5-0A1FAB5F9C22}"/>
+              </a:ext>
+            </a:extLst>
+          </p:cNvPr>
+          <p:cNvSpPr txBox="1"/>
+          <p:nvPr/>
+        </p:nvSpPr>
+        <p:spPr>
+          <a:xfrm>
+            <a:off x="1352177" y="4889140"/>
+            <a:ext cx="439544" cy="215444"/>
+          </a:xfrm>
+          <a:prstGeom prst="rect">
+            <a:avLst/>
+          </a:prstGeom>
+          <a:noFill/>
+        </p:spPr>
+        <p:txBody>
+          <a:bodyPr wrap="square" rtlCol="0">
+            <a:spAutoFit/>
+          </a:bodyPr>
+          <a:lstStyle/>
+          <a:p>
+            <a:r>
+              <a:rPr lang="es-ES" sz="800" dirty="0"/>
+              <a:t>FOTO</a:t>
+            </a:r>
+          </a:p>
+        </p:txBody>
+      </p:sp>
+      <p:sp>
+        <p:nvSpPr>
+          <p:cNvPr id="148" name="Rectángulo 147">
+            <a:extLst>
+              <a:ext uri="{FF2B5EF4-FFF2-40B4-BE49-F238E27FC236}">
+                <a16:creationId xmlns:a16="http://schemas.microsoft.com/office/drawing/2014/main" id="{D0783304-008F-68BE-3D4C-F23CFE8AED73}"/>
+              </a:ext>
+            </a:extLst>
+          </p:cNvPr>
+          <p:cNvSpPr/>
+          <p:nvPr/>
+        </p:nvSpPr>
+        <p:spPr>
+          <a:xfrm>
+            <a:off x="2939009" y="4875071"/>
+            <a:ext cx="170016" cy="210409"/>
+          </a:xfrm>
+          <a:prstGeom prst="rect">
+            <a:avLst/>
+          </a:prstGeom>
+          <a:solidFill>
+            <a:srgbClr val="FF0000"/>
+          </a:solidFill>
+          <a:ln>
+            <a:solidFill>
+              <a:srgbClr val="FF0000"/>
+            </a:solidFill>
+          </a:ln>
+        </p:spPr>
+        <p:style>
+          <a:lnRef idx="2">
+            <a:schemeClr val="accent1">
+              <a:shade val="15000"/>
+            </a:schemeClr>
+          </a:lnRef>
+          <a:fillRef idx="1">
+            <a:schemeClr val="accent1"/>
+          </a:fillRef>
+          <a:effectRef idx="0">
+            <a:schemeClr val="accent1"/>
+          </a:effectRef>
+          <a:fontRef idx="minor">
+            <a:schemeClr val="lt1"/>
+          </a:fontRef>
+        </p:style>
+        <p:txBody>
+          <a:bodyPr rtlCol="0" anchor="ctr"/>
+          <a:lstStyle/>
+          <a:p>
+            <a:pPr algn="ctr"/>
+            <a:endParaRPr lang="es-ES"/>
+          </a:p>
+        </p:txBody>
+      </p:sp>
+      <p:sp>
+        <p:nvSpPr>
+          <p:cNvPr id="149" name="CuadroTexto 148">
+            <a:extLst>
+              <a:ext uri="{FF2B5EF4-FFF2-40B4-BE49-F238E27FC236}">
+                <a16:creationId xmlns:a16="http://schemas.microsoft.com/office/drawing/2014/main" id="{D00E9A3E-08C9-E08D-C2B3-B16D26FFABB1}"/>
+              </a:ext>
+            </a:extLst>
+          </p:cNvPr>
+          <p:cNvSpPr txBox="1"/>
+          <p:nvPr/>
+        </p:nvSpPr>
+        <p:spPr>
+          <a:xfrm>
+            <a:off x="1480074" y="5264275"/>
+            <a:ext cx="1425390" cy="215444"/>
+          </a:xfrm>
+          <a:prstGeom prst="rect">
+            <a:avLst/>
+          </a:prstGeom>
+          <a:noFill/>
+        </p:spPr>
+        <p:txBody>
+          <a:bodyPr wrap="none" rtlCol="0">
+            <a:spAutoFit/>
+          </a:bodyPr>
+          <a:lstStyle/>
+          <a:p>
+            <a:r>
+              <a:rPr lang="es-ES" sz="800" dirty="0"/>
+              <a:t>COMENTARIO DEL CLIENTE</a:t>
+            </a:r>
+          </a:p>
+        </p:txBody>
+      </p:sp>
+      <p:sp>
+        <p:nvSpPr>
+          <p:cNvPr id="150" name="Rectángulo 149">
+            <a:extLst>
+              <a:ext uri="{FF2B5EF4-FFF2-40B4-BE49-F238E27FC236}">
+                <a16:creationId xmlns:a16="http://schemas.microsoft.com/office/drawing/2014/main" id="{16560C1B-E99C-B915-4591-978481E004BC}"/>
+              </a:ext>
+            </a:extLst>
+          </p:cNvPr>
+          <p:cNvSpPr/>
+          <p:nvPr/>
+        </p:nvSpPr>
+        <p:spPr>
+          <a:xfrm>
+            <a:off x="2644729" y="4900606"/>
+            <a:ext cx="242819" cy="210409"/>
+          </a:xfrm>
+          <a:prstGeom prst="rect">
+            <a:avLst/>
+          </a:prstGeom>
+          <a:solidFill>
+            <a:schemeClr val="accent1"/>
+          </a:solidFill>
+          <a:ln>
+            <a:solidFill>
+              <a:schemeClr val="accent1"/>
+            </a:solidFill>
+          </a:ln>
+        </p:spPr>
+        <p:style>
+          <a:lnRef idx="2">
+            <a:schemeClr val="accent1">
+              <a:shade val="15000"/>
+            </a:schemeClr>
+          </a:lnRef>
+          <a:fillRef idx="1">
+            <a:schemeClr val="accent1"/>
+          </a:fillRef>
+          <a:effectRef idx="0">
+            <a:schemeClr val="accent1"/>
+          </a:effectRef>
+          <a:fontRef idx="minor">
+            <a:schemeClr val="lt1"/>
+          </a:fontRef>
+        </p:style>
+        <p:txBody>
+          <a:bodyPr rtlCol="0" anchor="ctr"/>
+          <a:lstStyle/>
+          <a:p>
+            <a:pPr algn="ctr"/>
+            <a:endParaRPr lang="es-ES"/>
+          </a:p>
+        </p:txBody>
+      </p:sp>
+    </p:spTree>
+    <p:extLst>
+      <p:ext uri="{BB962C8B-B14F-4D97-AF65-F5344CB8AC3E}">
+        <p14:creationId xmlns:p14="http://schemas.microsoft.com/office/powerpoint/2010/main" val="1064132073"/>
       </p:ext>
     </p:extLst>
   </p:cSld>

</xml_diff>